<commit_message>
Added hybrid search example slide
</commit_message>
<xml_diff>
--- a/slides/7_DocumentWebSearching.pptx
+++ b/slides/7_DocumentWebSearching.pptx
@@ -5,7 +5,7 @@
     <p:sldMasterId id="2147483648" r:id="rId1"/>
   </p:sldMasterIdLst>
   <p:notesMasterIdLst>
-    <p:notesMasterId r:id="rId53"/>
+    <p:notesMasterId r:id="rId54"/>
   </p:notesMasterIdLst>
   <p:sldIdLst>
     <p:sldId id="275" r:id="rId2"/>
@@ -47,18 +47,19 @@
     <p:sldId id="782" r:id="rId38"/>
     <p:sldId id="785" r:id="rId39"/>
     <p:sldId id="784" r:id="rId40"/>
-    <p:sldId id="791" r:id="rId41"/>
-    <p:sldId id="396" r:id="rId42"/>
-    <p:sldId id="788" r:id="rId43"/>
-    <p:sldId id="397" r:id="rId44"/>
-    <p:sldId id="789" r:id="rId45"/>
-    <p:sldId id="790" r:id="rId46"/>
-    <p:sldId id="379" r:id="rId47"/>
-    <p:sldId id="388" r:id="rId48"/>
-    <p:sldId id="378" r:id="rId49"/>
-    <p:sldId id="382" r:id="rId50"/>
-    <p:sldId id="381" r:id="rId51"/>
-    <p:sldId id="328" r:id="rId52"/>
+    <p:sldId id="792" r:id="rId41"/>
+    <p:sldId id="791" r:id="rId42"/>
+    <p:sldId id="396" r:id="rId43"/>
+    <p:sldId id="788" r:id="rId44"/>
+    <p:sldId id="397" r:id="rId45"/>
+    <p:sldId id="789" r:id="rId46"/>
+    <p:sldId id="790" r:id="rId47"/>
+    <p:sldId id="379" r:id="rId48"/>
+    <p:sldId id="388" r:id="rId49"/>
+    <p:sldId id="378" r:id="rId50"/>
+    <p:sldId id="382" r:id="rId51"/>
+    <p:sldId id="381" r:id="rId52"/>
+    <p:sldId id="328" r:id="rId53"/>
   </p:sldIdLst>
   <p:sldSz cx="12192000" cy="6858000"/>
   <p:notesSz cx="6858000" cy="9144000"/>
@@ -247,7 +248,7 @@
           <a:p>
             <a:fld id="{AD10E277-7B52-48CF-8A81-813C08FCADB8}" type="datetimeFigureOut">
               <a:rPr lang="en-US" smtClean="0"/>
-              <a:t>7/21/2025</a:t>
+              <a:t>9/22/2025</a:t>
             </a:fld>
             <a:endParaRPr lang="en-US"/>
           </a:p>
@@ -770,7 +771,7 @@
           <a:p>
             <a:fld id="{A0BE7E77-FE47-445E-A4A9-C9AC534D337D}" type="datetimeFigureOut">
               <a:rPr lang="en-US" smtClean="0"/>
-              <a:t>7/21/2025</a:t>
+              <a:t>9/22/2025</a:t>
             </a:fld>
             <a:endParaRPr lang="en-US"/>
           </a:p>
@@ -968,7 +969,7 @@
           <a:p>
             <a:fld id="{A0BE7E77-FE47-445E-A4A9-C9AC534D337D}" type="datetimeFigureOut">
               <a:rPr lang="en-US" smtClean="0"/>
-              <a:t>7/21/2025</a:t>
+              <a:t>9/22/2025</a:t>
             </a:fld>
             <a:endParaRPr lang="en-US"/>
           </a:p>
@@ -1176,7 +1177,7 @@
           <a:p>
             <a:fld id="{A0BE7E77-FE47-445E-A4A9-C9AC534D337D}" type="datetimeFigureOut">
               <a:rPr lang="en-US" smtClean="0"/>
-              <a:t>7/21/2025</a:t>
+              <a:t>9/22/2025</a:t>
             </a:fld>
             <a:endParaRPr lang="en-US"/>
           </a:p>
@@ -1546,7 +1547,7 @@
           <a:p>
             <a:fld id="{A0BE7E77-FE47-445E-A4A9-C9AC534D337D}" type="datetimeFigureOut">
               <a:rPr lang="en-US" smtClean="0"/>
-              <a:t>7/21/2025</a:t>
+              <a:t>9/22/2025</a:t>
             </a:fld>
             <a:endParaRPr lang="en-US"/>
           </a:p>
@@ -1821,7 +1822,7 @@
           <a:p>
             <a:fld id="{A0BE7E77-FE47-445E-A4A9-C9AC534D337D}" type="datetimeFigureOut">
               <a:rPr lang="en-US" smtClean="0"/>
-              <a:t>7/21/2025</a:t>
+              <a:t>9/22/2025</a:t>
             </a:fld>
             <a:endParaRPr lang="en-US"/>
           </a:p>
@@ -2086,7 +2087,7 @@
           <a:p>
             <a:fld id="{A0BE7E77-FE47-445E-A4A9-C9AC534D337D}" type="datetimeFigureOut">
               <a:rPr lang="en-US" smtClean="0"/>
-              <a:t>7/21/2025</a:t>
+              <a:t>9/22/2025</a:t>
             </a:fld>
             <a:endParaRPr lang="en-US"/>
           </a:p>
@@ -2498,7 +2499,7 @@
           <a:p>
             <a:fld id="{A0BE7E77-FE47-445E-A4A9-C9AC534D337D}" type="datetimeFigureOut">
               <a:rPr lang="en-US" smtClean="0"/>
-              <a:t>7/21/2025</a:t>
+              <a:t>9/22/2025</a:t>
             </a:fld>
             <a:endParaRPr lang="en-US"/>
           </a:p>
@@ -2639,7 +2640,7 @@
           <a:p>
             <a:fld id="{A0BE7E77-FE47-445E-A4A9-C9AC534D337D}" type="datetimeFigureOut">
               <a:rPr lang="en-US" smtClean="0"/>
-              <a:t>7/21/2025</a:t>
+              <a:t>9/22/2025</a:t>
             </a:fld>
             <a:endParaRPr lang="en-US"/>
           </a:p>
@@ -2752,7 +2753,7 @@
           <a:p>
             <a:fld id="{A0BE7E77-FE47-445E-A4A9-C9AC534D337D}" type="datetimeFigureOut">
               <a:rPr lang="en-US" smtClean="0"/>
-              <a:t>7/21/2025</a:t>
+              <a:t>9/22/2025</a:t>
             </a:fld>
             <a:endParaRPr lang="en-US"/>
           </a:p>
@@ -3063,7 +3064,7 @@
           <a:p>
             <a:fld id="{A0BE7E77-FE47-445E-A4A9-C9AC534D337D}" type="datetimeFigureOut">
               <a:rPr lang="en-US" smtClean="0"/>
-              <a:t>7/21/2025</a:t>
+              <a:t>9/22/2025</a:t>
             </a:fld>
             <a:endParaRPr lang="en-US"/>
           </a:p>
@@ -3351,7 +3352,7 @@
           <a:p>
             <a:fld id="{A0BE7E77-FE47-445E-A4A9-C9AC534D337D}" type="datetimeFigureOut">
               <a:rPr lang="en-US" smtClean="0"/>
-              <a:t>7/21/2025</a:t>
+              <a:t>9/22/2025</a:t>
             </a:fld>
             <a:endParaRPr lang="en-US"/>
           </a:p>
@@ -3592,7 +3593,7 @@
           <a:p>
             <a:fld id="{A0BE7E77-FE47-445E-A4A9-C9AC534D337D}" type="datetimeFigureOut">
               <a:rPr lang="en-US" smtClean="0"/>
-              <a:t>7/21/2025</a:t>
+              <a:t>9/22/2025</a:t>
             </a:fld>
             <a:endParaRPr lang="en-US"/>
           </a:p>
@@ -4390,8 +4391,8 @@
           <a:chExt cx="0" cy="0"/>
         </a:xfrm>
       </p:grpSpPr>
-      <mc:AlternateContent xmlns:mc="http://schemas.openxmlformats.org/markup-compatibility/2006">
-        <mc:Choice xmlns:a14="http://schemas.microsoft.com/office/drawing/2010/main" Requires="a14">
+      <mc:AlternateContent xmlns:mc="http://schemas.openxmlformats.org/markup-compatibility/2006" xmlns:a14="http://schemas.microsoft.com/office/drawing/2010/main">
+        <mc:Choice Requires="a14">
           <p:sp>
             <p:nvSpPr>
               <p:cNvPr id="3" name="Content Placeholder 2">
@@ -4524,7 +4525,7 @@
             </p:txBody>
           </p:sp>
         </mc:Choice>
-        <mc:Fallback>
+        <mc:Fallback xmlns="">
           <p:sp>
             <p:nvSpPr>
               <p:cNvPr id="3" name="Content Placeholder 2">
@@ -7892,8 +7893,8 @@
           <a:chExt cx="0" cy="0"/>
         </a:xfrm>
       </p:grpSpPr>
-      <mc:AlternateContent xmlns:mc="http://schemas.openxmlformats.org/markup-compatibility/2006">
-        <mc:Choice xmlns:a14="http://schemas.microsoft.com/office/drawing/2010/main" Requires="a14">
+      <mc:AlternateContent xmlns:mc="http://schemas.openxmlformats.org/markup-compatibility/2006" xmlns:a14="http://schemas.microsoft.com/office/drawing/2010/main">
+        <mc:Choice Requires="a14">
           <p:sp>
             <p:nvSpPr>
               <p:cNvPr id="3" name="Content Placeholder 2">
@@ -8082,7 +8083,7 @@
             </p:txBody>
           </p:sp>
         </mc:Choice>
-        <mc:Fallback>
+        <mc:Fallback xmlns="">
           <p:sp>
             <p:nvSpPr>
               <p:cNvPr id="3" name="Content Placeholder 2">
@@ -16960,8 +16961,8 @@
           <a:chExt cx="0" cy="0"/>
         </a:xfrm>
       </p:grpSpPr>
-      <mc:AlternateContent xmlns:mc="http://schemas.openxmlformats.org/markup-compatibility/2006">
-        <mc:Choice xmlns:a14="http://schemas.microsoft.com/office/drawing/2010/main" Requires="a14">
+      <mc:AlternateContent xmlns:mc="http://schemas.openxmlformats.org/markup-compatibility/2006" xmlns:a14="http://schemas.microsoft.com/office/drawing/2010/main">
+        <mc:Choice Requires="a14">
           <p:sp>
             <p:nvSpPr>
               <p:cNvPr id="3" name="Content Placeholder 2">
@@ -17198,7 +17199,19 @@
                         <a:rPr lang="en-US" b="0" i="1" smtClean="0">
                           <a:latin typeface="Cambria Math" panose="02040503050406030204" pitchFamily="18" charset="0"/>
                         </a:rPr>
-                        <m:t>=1−</m:t>
+                        <m:t>=</m:t>
+                      </m:r>
+                      <m:r>
+                        <a:rPr lang="en-US" b="0" i="1" smtClean="0">
+                          <a:latin typeface="Cambria Math" panose="02040503050406030204" pitchFamily="18" charset="0"/>
+                        </a:rPr>
+                        <m:t>1</m:t>
+                      </m:r>
+                      <m:r>
+                        <a:rPr lang="en-US" b="0" i="1" smtClean="0">
+                          <a:latin typeface="Cambria Math" panose="02040503050406030204" pitchFamily="18" charset="0"/>
+                        </a:rPr>
+                        <m:t>−</m:t>
                       </m:r>
                       <m:f>
                         <m:fPr>
@@ -17331,7 +17344,19 @@
                         <a:rPr lang="en-US" b="0" i="1" smtClean="0">
                           <a:latin typeface="Cambria Math" panose="02040503050406030204" pitchFamily="18" charset="0"/>
                         </a:rPr>
-                        <m:t>=1−</m:t>
+                        <m:t>=</m:t>
+                      </m:r>
+                      <m:r>
+                        <a:rPr lang="en-US" b="0" i="1" smtClean="0">
+                          <a:latin typeface="Cambria Math" panose="02040503050406030204" pitchFamily="18" charset="0"/>
+                        </a:rPr>
+                        <m:t>1</m:t>
+                      </m:r>
+                      <m:r>
+                        <a:rPr lang="en-US" b="0" i="1" smtClean="0">
+                          <a:latin typeface="Cambria Math" panose="02040503050406030204" pitchFamily="18" charset="0"/>
+                        </a:rPr>
+                        <m:t>−</m:t>
                       </m:r>
                       <m:f>
                         <m:fPr>
@@ -17362,7 +17387,13 @@
                         <a:rPr lang="en-US" b="0" i="1" smtClean="0">
                           <a:latin typeface="Cambria Math" panose="02040503050406030204" pitchFamily="18" charset="0"/>
                         </a:rPr>
-                        <m:t>=.73</m:t>
+                        <m:t>=.</m:t>
+                      </m:r>
+                      <m:r>
+                        <a:rPr lang="en-US" b="0" i="1" smtClean="0">
+                          <a:latin typeface="Cambria Math" panose="02040503050406030204" pitchFamily="18" charset="0"/>
+                        </a:rPr>
+                        <m:t>73</m:t>
                       </m:r>
                     </m:oMath>
                   </m:oMathPara>
@@ -17499,7 +17530,7 @@
             </p:txBody>
           </p:sp>
         </mc:Choice>
-        <mc:Fallback>
+        <mc:Fallback xmlns="">
           <p:sp>
             <p:nvSpPr>
               <p:cNvPr id="3" name="Content Placeholder 2">
@@ -18538,8 +18569,8 @@
           <a:chExt cx="0" cy="0"/>
         </a:xfrm>
       </p:grpSpPr>
-      <mc:AlternateContent xmlns:mc="http://schemas.openxmlformats.org/markup-compatibility/2006">
-        <mc:Choice xmlns:a14="http://schemas.microsoft.com/office/drawing/2010/main" Requires="a14">
+      <mc:AlternateContent xmlns:mc="http://schemas.openxmlformats.org/markup-compatibility/2006" xmlns:a14="http://schemas.microsoft.com/office/drawing/2010/main">
+        <mc:Choice Requires="a14">
           <p:sp>
             <p:nvSpPr>
               <p:cNvPr id="3" name="Content Placeholder 2">
@@ -19116,7 +19147,7 @@
             </p:txBody>
           </p:sp>
         </mc:Choice>
-        <mc:Fallback>
+        <mc:Fallback xmlns="">
           <p:sp>
             <p:nvSpPr>
               <p:cNvPr id="3" name="Content Placeholder 2">
@@ -19547,8 +19578,8 @@
           <a:chExt cx="0" cy="0"/>
         </a:xfrm>
       </p:grpSpPr>
-      <mc:AlternateContent xmlns:mc="http://schemas.openxmlformats.org/markup-compatibility/2006">
-        <mc:Choice xmlns:a14="http://schemas.microsoft.com/office/drawing/2010/main" Requires="a14">
+      <mc:AlternateContent xmlns:mc="http://schemas.openxmlformats.org/markup-compatibility/2006" xmlns:a14="http://schemas.microsoft.com/office/drawing/2010/main">
+        <mc:Choice Requires="a14">
           <p:sp>
             <p:nvSpPr>
               <p:cNvPr id="3" name="Content Placeholder 2">
@@ -19827,7 +19858,7 @@
             </p:txBody>
           </p:sp>
         </mc:Choice>
-        <mc:Fallback>
+        <mc:Fallback xmlns="">
           <p:sp>
             <p:nvSpPr>
               <p:cNvPr id="3" name="Content Placeholder 2">
@@ -20579,7 +20610,14 @@
                         <a:latin typeface="Cambria Math" panose="02040503050406030204" pitchFamily="18" charset="0"/>
                         <a:ea typeface="Cambria Math" panose="02040503050406030204" pitchFamily="18" charset="0"/>
                       </a:rPr>
-                      <m:t>90%</m:t>
+                      <m:t>90</m:t>
+                    </m:r>
+                    <m:r>
+                      <a:rPr lang="en-US" b="0" i="1" smtClean="0">
+                        <a:latin typeface="Cambria Math" panose="02040503050406030204" pitchFamily="18" charset="0"/>
+                        <a:ea typeface="Cambria Math" panose="02040503050406030204" pitchFamily="18" charset="0"/>
+                      </a:rPr>
+                      <m:t>%</m:t>
                     </m:r>
                   </m:oMath>
                 </a14:m>
@@ -21990,7 +22028,13 @@
                                 <a:rPr lang="en-US" b="0" i="1" smtClean="0">
                                   <a:latin typeface="Cambria Math" panose="02040503050406030204" pitchFamily="18" charset="0"/>
                                 </a:rPr>
-                                <m:t>+1</m:t>
+                                <m:t>+</m:t>
+                              </m:r>
+                              <m:r>
+                                <a:rPr lang="en-US" b="0" i="1" smtClean="0">
+                                  <a:latin typeface="Cambria Math" panose="02040503050406030204" pitchFamily="18" charset="0"/>
+                                </a:rPr>
+                                <m:t>1</m:t>
                               </m:r>
                             </m:e>
                           </m:d>
@@ -22034,7 +22078,13 @@
                                 <a:rPr lang="en-US" b="0" i="1" smtClean="0">
                                   <a:latin typeface="Cambria Math" panose="02040503050406030204" pitchFamily="18" charset="0"/>
                                 </a:rPr>
-                                <m:t>1−</m:t>
+                                <m:t>1</m:t>
+                              </m:r>
+                              <m:r>
+                                <a:rPr lang="en-US" b="0" i="1" smtClean="0">
+                                  <a:latin typeface="Cambria Math" panose="02040503050406030204" pitchFamily="18" charset="0"/>
+                                </a:rPr>
+                                <m:t>−</m:t>
                               </m:r>
                               <m:r>
                                 <a:rPr lang="en-US" b="0" i="1" smtClean="0">
@@ -22449,7 +22499,55 @@
                       <a:rPr lang="en-US" b="0" i="1" smtClean="0">
                         <a:latin typeface="Cambria Math" panose="02040503050406030204" pitchFamily="18" charset="0"/>
                       </a:rPr>
-                      <m:t>[1.2,2.0]</m:t>
+                      <m:t>[</m:t>
+                    </m:r>
+                    <m:r>
+                      <a:rPr lang="en-US" b="0" i="1" smtClean="0">
+                        <a:latin typeface="Cambria Math" panose="02040503050406030204" pitchFamily="18" charset="0"/>
+                      </a:rPr>
+                      <m:t>1</m:t>
+                    </m:r>
+                    <m:r>
+                      <a:rPr lang="en-US" b="0" i="1" smtClean="0">
+                        <a:latin typeface="Cambria Math" panose="02040503050406030204" pitchFamily="18" charset="0"/>
+                      </a:rPr>
+                      <m:t>.</m:t>
+                    </m:r>
+                    <m:r>
+                      <a:rPr lang="en-US" b="0" i="1" smtClean="0">
+                        <a:latin typeface="Cambria Math" panose="02040503050406030204" pitchFamily="18" charset="0"/>
+                      </a:rPr>
+                      <m:t>2</m:t>
+                    </m:r>
+                    <m:r>
+                      <a:rPr lang="en-US" b="0" i="1" smtClean="0">
+                        <a:latin typeface="Cambria Math" panose="02040503050406030204" pitchFamily="18" charset="0"/>
+                      </a:rPr>
+                      <m:t>,</m:t>
+                    </m:r>
+                    <m:r>
+                      <a:rPr lang="en-US" b="0" i="1" smtClean="0">
+                        <a:latin typeface="Cambria Math" panose="02040503050406030204" pitchFamily="18" charset="0"/>
+                      </a:rPr>
+                      <m:t>2</m:t>
+                    </m:r>
+                    <m:r>
+                      <a:rPr lang="en-US" b="0" i="1" smtClean="0">
+                        <a:latin typeface="Cambria Math" panose="02040503050406030204" pitchFamily="18" charset="0"/>
+                      </a:rPr>
+                      <m:t>.</m:t>
+                    </m:r>
+                    <m:r>
+                      <a:rPr lang="en-US" b="0" i="1" smtClean="0">
+                        <a:latin typeface="Cambria Math" panose="02040503050406030204" pitchFamily="18" charset="0"/>
+                      </a:rPr>
+                      <m:t>0</m:t>
+                    </m:r>
+                    <m:r>
+                      <a:rPr lang="en-US" b="0" i="1" smtClean="0">
+                        <a:latin typeface="Cambria Math" panose="02040503050406030204" pitchFamily="18" charset="0"/>
+                      </a:rPr>
+                      <m:t>]</m:t>
                     </m:r>
                   </m:oMath>
                 </a14:m>
@@ -22479,7 +22577,19 @@
                       <a:rPr lang="en-US" b="0" i="1" smtClean="0">
                         <a:latin typeface="Cambria Math" panose="02040503050406030204" pitchFamily="18" charset="0"/>
                       </a:rPr>
-                      <m:t>0.75</m:t>
+                      <m:t>0</m:t>
+                    </m:r>
+                    <m:r>
+                      <a:rPr lang="en-US" b="0" i="1" smtClean="0">
+                        <a:latin typeface="Cambria Math" panose="02040503050406030204" pitchFamily="18" charset="0"/>
+                      </a:rPr>
+                      <m:t>.</m:t>
+                    </m:r>
+                    <m:r>
+                      <a:rPr lang="en-US" b="0" i="1" smtClean="0">
+                        <a:latin typeface="Cambria Math" panose="02040503050406030204" pitchFamily="18" charset="0"/>
+                      </a:rPr>
+                      <m:t>75</m:t>
                     </m:r>
                   </m:oMath>
                 </a14:m>
@@ -22987,8 +23097,8 @@
           <a:chExt cx="0" cy="0"/>
         </a:xfrm>
       </p:grpSpPr>
-      <mc:AlternateContent xmlns:mc="http://schemas.openxmlformats.org/markup-compatibility/2006">
-        <mc:Choice xmlns:a14="http://schemas.microsoft.com/office/drawing/2010/main" Requires="a14">
+      <mc:AlternateContent xmlns:mc="http://schemas.openxmlformats.org/markup-compatibility/2006" xmlns:a14="http://schemas.microsoft.com/office/drawing/2010/main">
+        <mc:Choice Requires="a14">
           <p:sp>
             <p:nvSpPr>
               <p:cNvPr id="3" name="Content Placeholder 2">
@@ -23308,7 +23418,13 @@
                                 <a:rPr lang="en-US" b="0" i="1" smtClean="0">
                                   <a:latin typeface="Cambria Math" panose="02040503050406030204" pitchFamily="18" charset="0"/>
                                 </a:rPr>
-                                <m:t>+1</m:t>
+                                <m:t>+</m:t>
+                              </m:r>
+                              <m:r>
+                                <a:rPr lang="en-US" b="0" i="1" smtClean="0">
+                                  <a:latin typeface="Cambria Math" panose="02040503050406030204" pitchFamily="18" charset="0"/>
+                                </a:rPr>
+                                <m:t>1</m:t>
                               </m:r>
                             </m:e>
                           </m:d>
@@ -23352,7 +23468,13 @@
                                 <a:rPr lang="en-US" b="0" i="1" smtClean="0">
                                   <a:latin typeface="Cambria Math" panose="02040503050406030204" pitchFamily="18" charset="0"/>
                                 </a:rPr>
-                                <m:t>1−</m:t>
+                                <m:t>1</m:t>
+                              </m:r>
+                              <m:r>
+                                <a:rPr lang="en-US" b="0" i="1" smtClean="0">
+                                  <a:latin typeface="Cambria Math" panose="02040503050406030204" pitchFamily="18" charset="0"/>
+                                </a:rPr>
+                                <m:t>−</m:t>
                               </m:r>
                               <m:r>
                                 <a:rPr lang="en-US" b="0" i="1" smtClean="0">
@@ -23564,7 +23686,25 @@
                               <a:rPr lang="en-US" b="0" i="1" smtClean="0">
                                 <a:latin typeface="Cambria Math" panose="02040503050406030204" pitchFamily="18" charset="0"/>
                               </a:rPr>
-                              <m:t>+0.5</m:t>
+                              <m:t>+</m:t>
+                            </m:r>
+                            <m:r>
+                              <a:rPr lang="en-US" b="0" i="1" smtClean="0">
+                                <a:latin typeface="Cambria Math" panose="02040503050406030204" pitchFamily="18" charset="0"/>
+                              </a:rPr>
+                              <m:t>0</m:t>
+                            </m:r>
+                            <m:r>
+                              <a:rPr lang="en-US" b="0" i="1" smtClean="0">
+                                <a:latin typeface="Cambria Math" panose="02040503050406030204" pitchFamily="18" charset="0"/>
+                              </a:rPr>
+                              <m:t>.</m:t>
+                            </m:r>
+                            <m:r>
+                              <a:rPr lang="en-US" b="0" i="1" smtClean="0">
+                                <a:latin typeface="Cambria Math" panose="02040503050406030204" pitchFamily="18" charset="0"/>
+                              </a:rPr>
+                              <m:t>5</m:t>
                             </m:r>
                           </m:num>
                           <m:den>
@@ -23614,7 +23754,25 @@
                               <a:rPr lang="en-US" i="1">
                                 <a:latin typeface="Cambria Math" panose="02040503050406030204" pitchFamily="18" charset="0"/>
                               </a:rPr>
-                              <m:t>+0.5</m:t>
+                              <m:t>+</m:t>
+                            </m:r>
+                            <m:r>
+                              <a:rPr lang="en-US" i="1">
+                                <a:latin typeface="Cambria Math" panose="02040503050406030204" pitchFamily="18" charset="0"/>
+                              </a:rPr>
+                              <m:t>0</m:t>
+                            </m:r>
+                            <m:r>
+                              <a:rPr lang="en-US" i="1">
+                                <a:latin typeface="Cambria Math" panose="02040503050406030204" pitchFamily="18" charset="0"/>
+                              </a:rPr>
+                              <m:t>.</m:t>
+                            </m:r>
+                            <m:r>
+                              <a:rPr lang="en-US" i="1">
+                                <a:latin typeface="Cambria Math" panose="02040503050406030204" pitchFamily="18" charset="0"/>
+                              </a:rPr>
+                              <m:t>5</m:t>
                             </m:r>
                           </m:den>
                         </m:f>
@@ -23622,7 +23780,13 @@
                           <a:rPr lang="en-US" b="0" i="1" smtClean="0">
                             <a:latin typeface="Cambria Math" panose="02040503050406030204" pitchFamily="18" charset="0"/>
                           </a:rPr>
-                          <m:t>+1</m:t>
+                          <m:t>+</m:t>
+                        </m:r>
+                        <m:r>
+                          <a:rPr lang="en-US" b="0" i="1" smtClean="0">
+                            <a:latin typeface="Cambria Math" panose="02040503050406030204" pitchFamily="18" charset="0"/>
+                          </a:rPr>
+                          <m:t>1</m:t>
                         </m:r>
                       </m:e>
                     </m:d>
@@ -23752,7 +23916,7 @@
             </p:txBody>
           </p:sp>
         </mc:Choice>
-        <mc:Fallback>
+        <mc:Fallback xmlns="">
           <p:sp>
             <p:nvSpPr>
               <p:cNvPr id="3" name="Content Placeholder 2">
@@ -23869,8 +24033,8 @@
           <a:chExt cx="0" cy="0"/>
         </a:xfrm>
       </p:grpSpPr>
-      <mc:AlternateContent xmlns:mc="http://schemas.openxmlformats.org/markup-compatibility/2006">
-        <mc:Choice xmlns:a14="http://schemas.microsoft.com/office/drawing/2010/main" Requires="a14">
+      <mc:AlternateContent xmlns:mc="http://schemas.openxmlformats.org/markup-compatibility/2006" xmlns:a14="http://schemas.microsoft.com/office/drawing/2010/main">
+        <mc:Choice Requires="a14">
           <p:sp>
             <p:nvSpPr>
               <p:cNvPr id="3" name="Content Placeholder 2">
@@ -24190,7 +24354,13 @@
                                 <a:rPr lang="en-US" b="0" i="1" smtClean="0">
                                   <a:latin typeface="Cambria Math" panose="02040503050406030204" pitchFamily="18" charset="0"/>
                                 </a:rPr>
-                                <m:t>+1</m:t>
+                                <m:t>+</m:t>
+                              </m:r>
+                              <m:r>
+                                <a:rPr lang="en-US" b="0" i="1" smtClean="0">
+                                  <a:latin typeface="Cambria Math" panose="02040503050406030204" pitchFamily="18" charset="0"/>
+                                </a:rPr>
+                                <m:t>1</m:t>
                               </m:r>
                             </m:e>
                           </m:d>
@@ -24234,7 +24404,13 @@
                                 <a:rPr lang="en-US" b="0" i="1" smtClean="0">
                                   <a:latin typeface="Cambria Math" panose="02040503050406030204" pitchFamily="18" charset="0"/>
                                 </a:rPr>
-                                <m:t>1−</m:t>
+                                <m:t>1</m:t>
+                              </m:r>
+                              <m:r>
+                                <a:rPr lang="en-US" b="0" i="1" smtClean="0">
+                                  <a:latin typeface="Cambria Math" panose="02040503050406030204" pitchFamily="18" charset="0"/>
+                                </a:rPr>
+                                <m:t>−</m:t>
                               </m:r>
                               <m:r>
                                 <a:rPr lang="en-US" b="0" i="1" smtClean="0">
@@ -24348,7 +24524,55 @@
                       <a:rPr lang="en-US" b="0" i="1" smtClean="0">
                         <a:latin typeface="Cambria Math" panose="02040503050406030204" pitchFamily="18" charset="0"/>
                       </a:rPr>
-                      <m:t>[1.2, 2.0]</m:t>
+                      <m:t>[</m:t>
+                    </m:r>
+                    <m:r>
+                      <a:rPr lang="en-US" b="0" i="1" smtClean="0">
+                        <a:latin typeface="Cambria Math" panose="02040503050406030204" pitchFamily="18" charset="0"/>
+                      </a:rPr>
+                      <m:t>1</m:t>
+                    </m:r>
+                    <m:r>
+                      <a:rPr lang="en-US" b="0" i="1" smtClean="0">
+                        <a:latin typeface="Cambria Math" panose="02040503050406030204" pitchFamily="18" charset="0"/>
+                      </a:rPr>
+                      <m:t>.</m:t>
+                    </m:r>
+                    <m:r>
+                      <a:rPr lang="en-US" b="0" i="1" smtClean="0">
+                        <a:latin typeface="Cambria Math" panose="02040503050406030204" pitchFamily="18" charset="0"/>
+                      </a:rPr>
+                      <m:t>2</m:t>
+                    </m:r>
+                    <m:r>
+                      <a:rPr lang="en-US" b="0" i="1" smtClean="0">
+                        <a:latin typeface="Cambria Math" panose="02040503050406030204" pitchFamily="18" charset="0"/>
+                      </a:rPr>
+                      <m:t>, </m:t>
+                    </m:r>
+                    <m:r>
+                      <a:rPr lang="en-US" b="0" i="1" smtClean="0">
+                        <a:latin typeface="Cambria Math" panose="02040503050406030204" pitchFamily="18" charset="0"/>
+                      </a:rPr>
+                      <m:t>2</m:t>
+                    </m:r>
+                    <m:r>
+                      <a:rPr lang="en-US" b="0" i="1" smtClean="0">
+                        <a:latin typeface="Cambria Math" panose="02040503050406030204" pitchFamily="18" charset="0"/>
+                      </a:rPr>
+                      <m:t>.</m:t>
+                    </m:r>
+                    <m:r>
+                      <a:rPr lang="en-US" b="0" i="1" smtClean="0">
+                        <a:latin typeface="Cambria Math" panose="02040503050406030204" pitchFamily="18" charset="0"/>
+                      </a:rPr>
+                      <m:t>0</m:t>
+                    </m:r>
+                    <m:r>
+                      <a:rPr lang="en-US" b="0" i="1" smtClean="0">
+                        <a:latin typeface="Cambria Math" panose="02040503050406030204" pitchFamily="18" charset="0"/>
+                      </a:rPr>
+                      <m:t>]</m:t>
                     </m:r>
                   </m:oMath>
                 </a14:m>
@@ -24397,7 +24621,25 @@
                       <a:rPr lang="en-US" b="0" i="0" smtClean="0">
                         <a:latin typeface="Cambria Math" panose="02040503050406030204" pitchFamily="18" charset="0"/>
                       </a:rPr>
-                      <m:t>=1.2</m:t>
+                      <m:t>=</m:t>
+                    </m:r>
+                    <m:r>
+                      <a:rPr lang="en-US" b="0" i="0" smtClean="0">
+                        <a:latin typeface="Cambria Math" panose="02040503050406030204" pitchFamily="18" charset="0"/>
+                      </a:rPr>
+                      <m:t>1</m:t>
+                    </m:r>
+                    <m:r>
+                      <a:rPr lang="en-US" b="0" i="0" smtClean="0">
+                        <a:latin typeface="Cambria Math" panose="02040503050406030204" pitchFamily="18" charset="0"/>
+                      </a:rPr>
+                      <m:t>.</m:t>
+                    </m:r>
+                    <m:r>
+                      <a:rPr lang="en-US" b="0" i="0" smtClean="0">
+                        <a:latin typeface="Cambria Math" panose="02040503050406030204" pitchFamily="18" charset="0"/>
+                      </a:rPr>
+                      <m:t>2</m:t>
                     </m:r>
                   </m:oMath>
                 </a14:m>
@@ -24612,7 +24854,25 @@
                       <a:rPr lang="en-US" b="0" i="1" smtClean="0">
                         <a:latin typeface="Cambria Math" panose="02040503050406030204" pitchFamily="18" charset="0"/>
                       </a:rPr>
-                      <m:t>=0.75</m:t>
+                      <m:t>=</m:t>
+                    </m:r>
+                    <m:r>
+                      <a:rPr lang="en-US" b="0" i="1" smtClean="0">
+                        <a:latin typeface="Cambria Math" panose="02040503050406030204" pitchFamily="18" charset="0"/>
+                      </a:rPr>
+                      <m:t>0</m:t>
+                    </m:r>
+                    <m:r>
+                      <a:rPr lang="en-US" b="0" i="1" smtClean="0">
+                        <a:latin typeface="Cambria Math" panose="02040503050406030204" pitchFamily="18" charset="0"/>
+                      </a:rPr>
+                      <m:t>.</m:t>
+                    </m:r>
+                    <m:r>
+                      <a:rPr lang="en-US" b="0" i="1" smtClean="0">
+                        <a:latin typeface="Cambria Math" panose="02040503050406030204" pitchFamily="18" charset="0"/>
+                      </a:rPr>
+                      <m:t>75</m:t>
                     </m:r>
                   </m:oMath>
                 </a14:m>
@@ -24677,7 +24937,14 @@
                         <a:latin typeface="Cambria Math" panose="02040503050406030204" pitchFamily="18" charset="0"/>
                         <a:ea typeface="Cambria Math" panose="02040503050406030204" pitchFamily="18" charset="0"/>
                       </a:rPr>
-                      <m:t>⇒0</m:t>
+                      <m:t>⇒</m:t>
+                    </m:r>
+                    <m:r>
+                      <a:rPr lang="en-US" i="1">
+                        <a:latin typeface="Cambria Math" panose="02040503050406030204" pitchFamily="18" charset="0"/>
+                        <a:ea typeface="Cambria Math" panose="02040503050406030204" pitchFamily="18" charset="0"/>
+                      </a:rPr>
+                      <m:t>0</m:t>
                     </m:r>
                   </m:oMath>
                 </a14:m>
@@ -24692,7 +24959,14 @@
                         <a:latin typeface="Cambria Math" panose="02040503050406030204" pitchFamily="18" charset="0"/>
                         <a:ea typeface="Cambria Math" panose="02040503050406030204" pitchFamily="18" charset="0"/>
                       </a:rPr>
-                      <m:t>⇒0</m:t>
+                      <m:t>⇒</m:t>
+                    </m:r>
+                    <m:r>
+                      <a:rPr lang="en-US" i="1">
+                        <a:latin typeface="Cambria Math" panose="02040503050406030204" pitchFamily="18" charset="0"/>
+                        <a:ea typeface="Cambria Math" panose="02040503050406030204" pitchFamily="18" charset="0"/>
+                      </a:rPr>
+                      <m:t>0</m:t>
                     </m:r>
                   </m:oMath>
                 </a14:m>
@@ -24701,7 +24975,7 @@
             </p:txBody>
           </p:sp>
         </mc:Choice>
-        <mc:Fallback>
+        <mc:Fallback xmlns="">
           <p:sp>
             <p:nvSpPr>
               <p:cNvPr id="3" name="Content Placeholder 2">
@@ -25132,8 +25406,8 @@
           <a:chExt cx="0" cy="0"/>
         </a:xfrm>
       </p:grpSpPr>
-      <mc:AlternateContent xmlns:mc="http://schemas.openxmlformats.org/markup-compatibility/2006">
-        <mc:Choice xmlns:a14="http://schemas.microsoft.com/office/drawing/2010/main" Requires="a14">
+      <mc:AlternateContent xmlns:mc="http://schemas.openxmlformats.org/markup-compatibility/2006" xmlns:a14="http://schemas.microsoft.com/office/drawing/2010/main">
+        <mc:Choice Requires="a14">
           <p:sp>
             <p:nvSpPr>
               <p:cNvPr id="3" name="Content Placeholder 2">
@@ -25253,7 +25527,7 @@
             </p:txBody>
           </p:sp>
         </mc:Choice>
-        <mc:Fallback>
+        <mc:Fallback xmlns="">
           <p:sp>
             <p:nvSpPr>
               <p:cNvPr id="3" name="Content Placeholder 2">
@@ -25500,8 +25774,8 @@
           <a:chExt cx="0" cy="0"/>
         </a:xfrm>
       </p:grpSpPr>
-      <mc:AlternateContent xmlns:mc="http://schemas.openxmlformats.org/markup-compatibility/2006">
-        <mc:Choice xmlns:a14="http://schemas.microsoft.com/office/drawing/2010/main" Requires="a14">
+      <mc:AlternateContent xmlns:mc="http://schemas.openxmlformats.org/markup-compatibility/2006" xmlns:a14="http://schemas.microsoft.com/office/drawing/2010/main">
+        <mc:Choice Requires="a14">
           <p:sp>
             <p:nvSpPr>
               <p:cNvPr id="3" name="Content Placeholder 2">
@@ -25744,7 +26018,7 @@
             </p:txBody>
           </p:sp>
         </mc:Choice>
-        <mc:Fallback>
+        <mc:Fallback xmlns="">
           <p:sp>
             <p:nvSpPr>
               <p:cNvPr id="3" name="Content Placeholder 2">
@@ -28724,12 +28998,12 @@
         <p:spPr>
           <a:xfrm>
             <a:off x="838200" y="1110712"/>
-            <a:ext cx="10515600" cy="5405041"/>
+            <a:ext cx="6005945" cy="5405041"/>
           </a:xfrm>
         </p:spPr>
         <p:txBody>
           <a:bodyPr>
-            <a:normAutofit lnSpcReduction="10000"/>
+            <a:normAutofit/>
           </a:bodyPr>
           <a:lstStyle/>
           <a:p>
@@ -28738,94 +29012,25 @@
             </a:pPr>
             <a:r>
               <a:rPr lang="en-US" dirty="0"/>
-              <a:t>There are several possibilities to create retriever-ranker pipelines  </a:t>
+              <a:t>Can use sparse and dense models in parallel</a:t>
             </a:r>
           </a:p>
           <a:p>
             <a:r>
               <a:rPr lang="en-US" dirty="0"/>
-              <a:t>Sparse vector retriever followed by cross encoder transformer model   </a:t>
-            </a:r>
-          </a:p>
-          <a:p>
-            <a:pPr lvl="1"/>
+              <a:t>Sparse and dense </a:t>
+            </a:r>
+            <a:r>
+              <a:rPr lang="en-US" dirty="0" err="1"/>
+              <a:t>retrivers</a:t>
+            </a:r>
             <a:r>
               <a:rPr lang="en-US" dirty="0"/>
-              <a:t>Sparse retriever creates filtered set of candidate documents based on keywords </a:t>
-            </a:r>
-          </a:p>
-          <a:p>
-            <a:pPr lvl="1"/>
-            <a:r>
-              <a:rPr lang="en-US" dirty="0" err="1"/>
-              <a:t>Reranker</a:t>
-            </a:r>
-            <a:r>
-              <a:rPr lang="en-US" dirty="0"/>
-              <a:t> performs exhaustive pairwise search between candidate documents and query     </a:t>
-            </a:r>
-          </a:p>
-          <a:p>
-            <a:r>
-              <a:rPr lang="en-US" dirty="0"/>
-              <a:t>Dense vector retriever followed by sparse vector receiver </a:t>
-            </a:r>
-          </a:p>
-          <a:p>
-            <a:pPr lvl="1"/>
-            <a:r>
-              <a:rPr lang="en-US" dirty="0"/>
-              <a:t>Efficient ANNS used to find candidate document set</a:t>
-            </a:r>
-          </a:p>
-          <a:p>
-            <a:pPr lvl="1"/>
-            <a:r>
-              <a:rPr lang="en-US" dirty="0"/>
-              <a:t>Sparse vector receiver filters and </a:t>
-            </a:r>
-            <a:r>
-              <a:rPr lang="en-US" dirty="0" err="1"/>
-              <a:t>reranks</a:t>
-            </a:r>
-            <a:r>
-              <a:rPr lang="en-US" dirty="0"/>
-              <a:t> candidate documents</a:t>
-            </a:r>
-          </a:p>
-          <a:p>
-            <a:r>
-              <a:rPr lang="en-US" dirty="0"/>
-              <a:t>Dense vector retriever followed by cross encoder transformer model   </a:t>
-            </a:r>
-          </a:p>
-          <a:p>
-            <a:pPr lvl="1"/>
-            <a:r>
-              <a:rPr lang="en-US" dirty="0"/>
-              <a:t>Efficient ANNS used to find candidate document set</a:t>
-            </a:r>
-          </a:p>
-          <a:p>
-            <a:pPr lvl="1"/>
-            <a:r>
-              <a:rPr lang="en-US" dirty="0" err="1"/>
-              <a:t>Reranker</a:t>
-            </a:r>
-            <a:r>
-              <a:rPr lang="en-US" dirty="0"/>
-              <a:t> performs exhaustive pairwise search between candidate documents and query     </a:t>
-            </a:r>
-          </a:p>
-          <a:p>
-            <a:r>
-              <a:rPr lang="en-US" dirty="0" err="1"/>
-              <a:t>Etc</a:t>
-            </a:r>
-            <a:r>
-              <a:rPr lang="en-US" dirty="0"/>
-              <a:t>…</a:t>
-            </a:r>
+              <a:t> are used in parallel   </a:t>
+            </a:r>
+          </a:p>
+          <a:p>
+            <a:endParaRPr lang="en-US" dirty="0"/>
           </a:p>
         </p:txBody>
       </p:sp>
@@ -28861,15 +29066,1270 @@
               <a:rPr lang="en-US" dirty="0">
                 <a:latin typeface="+mn-lt"/>
               </a:rPr>
-              <a:t>Sparse-Dense Pipelines</a:t>
-            </a:r>
+              <a:t>Hybrid Pipelines</a:t>
+            </a:r>
+          </a:p>
+        </p:txBody>
+      </p:sp>
+      <p:sp>
+        <p:nvSpPr>
+          <p:cNvPr id="2" name="Rectangle 1">
+            <a:extLst>
+              <a:ext uri="{FF2B5EF4-FFF2-40B4-BE49-F238E27FC236}">
+                <a16:creationId xmlns:a16="http://schemas.microsoft.com/office/drawing/2014/main" id="{7FF609A7-27B6-98C2-46D3-26B09DB5AA14}"/>
+              </a:ext>
+            </a:extLst>
+          </p:cNvPr>
+          <p:cNvSpPr/>
+          <p:nvPr/>
+        </p:nvSpPr>
+        <p:spPr>
+          <a:xfrm>
+            <a:off x="8555370" y="1083398"/>
+            <a:ext cx="2358172" cy="671801"/>
+          </a:xfrm>
+          <a:prstGeom prst="rect">
+            <a:avLst/>
+          </a:prstGeom>
+          <a:noFill/>
+          <a:ln w="25400"/>
+        </p:spPr>
+        <p:style>
+          <a:lnRef idx="2">
+            <a:schemeClr val="accent1">
+              <a:shade val="15000"/>
+            </a:schemeClr>
+          </a:lnRef>
+          <a:fillRef idx="1">
+            <a:schemeClr val="accent1"/>
+          </a:fillRef>
+          <a:effectRef idx="0">
+            <a:schemeClr val="accent1"/>
+          </a:effectRef>
+          <a:fontRef idx="minor">
+            <a:schemeClr val="lt1"/>
+          </a:fontRef>
+        </p:style>
+        <p:txBody>
+          <a:bodyPr rtlCol="0" anchor="ctr"/>
+          <a:lstStyle/>
+          <a:p>
+            <a:pPr algn="ctr"/>
+            <a:r>
+              <a:rPr lang="en-US" sz="2000" dirty="0">
+                <a:solidFill>
+                  <a:schemeClr val="tx1"/>
+                </a:solidFill>
+              </a:rPr>
+              <a:t>Query Vector</a:t>
+            </a:r>
+          </a:p>
+        </p:txBody>
+      </p:sp>
+      <p:sp>
+        <p:nvSpPr>
+          <p:cNvPr id="5" name="Rectangle: Rounded Corners 4">
+            <a:extLst>
+              <a:ext uri="{FF2B5EF4-FFF2-40B4-BE49-F238E27FC236}">
+                <a16:creationId xmlns:a16="http://schemas.microsoft.com/office/drawing/2014/main" id="{EC01D451-E0CC-905C-FF68-5280EC92DD85}"/>
+              </a:ext>
+            </a:extLst>
+          </p:cNvPr>
+          <p:cNvSpPr/>
+          <p:nvPr/>
+        </p:nvSpPr>
+        <p:spPr>
+          <a:xfrm>
+            <a:off x="9896771" y="2431260"/>
+            <a:ext cx="1994135" cy="1182004"/>
+          </a:xfrm>
+          <a:prstGeom prst="roundRect">
+            <a:avLst/>
+          </a:prstGeom>
+          <a:noFill/>
+          <a:ln w="31750"/>
+        </p:spPr>
+        <p:style>
+          <a:lnRef idx="2">
+            <a:schemeClr val="accent1">
+              <a:shade val="15000"/>
+            </a:schemeClr>
+          </a:lnRef>
+          <a:fillRef idx="1">
+            <a:schemeClr val="accent1"/>
+          </a:fillRef>
+          <a:effectRef idx="0">
+            <a:schemeClr val="accent1"/>
+          </a:effectRef>
+          <a:fontRef idx="minor">
+            <a:schemeClr val="lt1"/>
+          </a:fontRef>
+        </p:style>
+        <p:txBody>
+          <a:bodyPr rtlCol="0" anchor="ctr"/>
+          <a:lstStyle/>
+          <a:p>
+            <a:pPr algn="ctr"/>
+            <a:r>
+              <a:rPr lang="en-US" sz="2400" dirty="0">
+                <a:solidFill>
+                  <a:schemeClr val="tx1"/>
+                </a:solidFill>
+              </a:rPr>
+              <a:t>Dense embedding Retriever</a:t>
+            </a:r>
+          </a:p>
+        </p:txBody>
+      </p:sp>
+      <p:sp>
+        <p:nvSpPr>
+          <p:cNvPr id="6" name="Rectangle: Rounded Corners 5">
+            <a:extLst>
+              <a:ext uri="{FF2B5EF4-FFF2-40B4-BE49-F238E27FC236}">
+                <a16:creationId xmlns:a16="http://schemas.microsoft.com/office/drawing/2014/main" id="{48F19911-1DCB-E298-862D-B9B712B516F8}"/>
+              </a:ext>
+            </a:extLst>
+          </p:cNvPr>
+          <p:cNvSpPr/>
+          <p:nvPr/>
+        </p:nvSpPr>
+        <p:spPr>
+          <a:xfrm>
+            <a:off x="7558303" y="2431259"/>
+            <a:ext cx="1994135" cy="1182005"/>
+          </a:xfrm>
+          <a:prstGeom prst="roundRect">
+            <a:avLst/>
+          </a:prstGeom>
+          <a:noFill/>
+          <a:ln w="31750"/>
+        </p:spPr>
+        <p:style>
+          <a:lnRef idx="2">
+            <a:schemeClr val="accent1">
+              <a:shade val="15000"/>
+            </a:schemeClr>
+          </a:lnRef>
+          <a:fillRef idx="1">
+            <a:schemeClr val="accent1"/>
+          </a:fillRef>
+          <a:effectRef idx="0">
+            <a:schemeClr val="accent1"/>
+          </a:effectRef>
+          <a:fontRef idx="minor">
+            <a:schemeClr val="lt1"/>
+          </a:fontRef>
+        </p:style>
+        <p:txBody>
+          <a:bodyPr rtlCol="0" anchor="ctr"/>
+          <a:lstStyle/>
+          <a:p>
+            <a:pPr algn="ctr"/>
+            <a:r>
+              <a:rPr lang="en-US" sz="2400" dirty="0">
+                <a:solidFill>
+                  <a:schemeClr val="tx1"/>
+                </a:solidFill>
+              </a:rPr>
+              <a:t>Sparse embedding Retriever</a:t>
+            </a:r>
+          </a:p>
+        </p:txBody>
+      </p:sp>
+      <p:sp>
+        <p:nvSpPr>
+          <p:cNvPr id="7" name="Oval 6">
+            <a:extLst>
+              <a:ext uri="{FF2B5EF4-FFF2-40B4-BE49-F238E27FC236}">
+                <a16:creationId xmlns:a16="http://schemas.microsoft.com/office/drawing/2014/main" id="{4E491498-5B26-8DC4-B5AE-FAADD0977781}"/>
+              </a:ext>
+            </a:extLst>
+          </p:cNvPr>
+          <p:cNvSpPr/>
+          <p:nvPr/>
+        </p:nvSpPr>
+        <p:spPr>
+          <a:xfrm>
+            <a:off x="8692594" y="4359414"/>
+            <a:ext cx="2083723" cy="1337575"/>
+          </a:xfrm>
+          <a:prstGeom prst="ellipse">
+            <a:avLst/>
+          </a:prstGeom>
+          <a:noFill/>
+          <a:ln w="25400">
+            <a:solidFill>
+              <a:schemeClr val="tx1"/>
+            </a:solidFill>
+          </a:ln>
+        </p:spPr>
+        <p:style>
+          <a:lnRef idx="2">
+            <a:schemeClr val="accent1">
+              <a:shade val="15000"/>
+            </a:schemeClr>
+          </a:lnRef>
+          <a:fillRef idx="1">
+            <a:schemeClr val="accent1"/>
+          </a:fillRef>
+          <a:effectRef idx="0">
+            <a:schemeClr val="accent1"/>
+          </a:effectRef>
+          <a:fontRef idx="minor">
+            <a:schemeClr val="lt1"/>
+          </a:fontRef>
+        </p:style>
+        <p:txBody>
+          <a:bodyPr rtlCol="0" anchor="ctr"/>
+          <a:lstStyle/>
+          <a:p>
+            <a:pPr algn="ctr"/>
+            <a:r>
+              <a:rPr lang="en-US" sz="2400" dirty="0">
+                <a:solidFill>
+                  <a:schemeClr val="tx1"/>
+                </a:solidFill>
+              </a:rPr>
+              <a:t>Integrate scores</a:t>
+            </a:r>
+          </a:p>
+        </p:txBody>
+      </p:sp>
+      <p:cxnSp>
+        <p:nvCxnSpPr>
+          <p:cNvPr id="9" name="Straight Arrow Connector 8">
+            <a:extLst>
+              <a:ext uri="{FF2B5EF4-FFF2-40B4-BE49-F238E27FC236}">
+                <a16:creationId xmlns:a16="http://schemas.microsoft.com/office/drawing/2014/main" id="{744B7E13-924F-6602-2140-3B86C5697844}"/>
+              </a:ext>
+            </a:extLst>
+          </p:cNvPr>
+          <p:cNvCxnSpPr>
+            <a:stCxn id="2" idx="2"/>
+            <a:endCxn id="6" idx="0"/>
+          </p:cNvCxnSpPr>
+          <p:nvPr/>
+        </p:nvCxnSpPr>
+        <p:spPr>
+          <a:xfrm flipH="1">
+            <a:off x="8555371" y="1755199"/>
+            <a:ext cx="1179085" cy="676060"/>
+          </a:xfrm>
+          <a:prstGeom prst="straightConnector1">
+            <a:avLst/>
+          </a:prstGeom>
+          <a:ln w="38100">
+            <a:solidFill>
+              <a:schemeClr val="tx1"/>
+            </a:solidFill>
+            <a:tailEnd type="triangle"/>
+          </a:ln>
+        </p:spPr>
+        <p:style>
+          <a:lnRef idx="1">
+            <a:schemeClr val="accent1"/>
+          </a:lnRef>
+          <a:fillRef idx="0">
+            <a:schemeClr val="accent1"/>
+          </a:fillRef>
+          <a:effectRef idx="0">
+            <a:schemeClr val="accent1"/>
+          </a:effectRef>
+          <a:fontRef idx="minor">
+            <a:schemeClr val="tx1"/>
+          </a:fontRef>
+        </p:style>
+      </p:cxnSp>
+      <p:cxnSp>
+        <p:nvCxnSpPr>
+          <p:cNvPr id="10" name="Straight Arrow Connector 9">
+            <a:extLst>
+              <a:ext uri="{FF2B5EF4-FFF2-40B4-BE49-F238E27FC236}">
+                <a16:creationId xmlns:a16="http://schemas.microsoft.com/office/drawing/2014/main" id="{C1E0CABC-4340-6C40-16F8-625D5B492C3A}"/>
+              </a:ext>
+            </a:extLst>
+          </p:cNvPr>
+          <p:cNvCxnSpPr>
+            <a:cxnSpLocks/>
+            <a:stCxn id="2" idx="2"/>
+            <a:endCxn id="5" idx="0"/>
+          </p:cNvCxnSpPr>
+          <p:nvPr/>
+        </p:nvCxnSpPr>
+        <p:spPr>
+          <a:xfrm>
+            <a:off x="9734456" y="1755199"/>
+            <a:ext cx="1159383" cy="676061"/>
+          </a:xfrm>
+          <a:prstGeom prst="straightConnector1">
+            <a:avLst/>
+          </a:prstGeom>
+          <a:ln w="38100">
+            <a:solidFill>
+              <a:schemeClr val="tx1"/>
+            </a:solidFill>
+            <a:tailEnd type="triangle"/>
+          </a:ln>
+        </p:spPr>
+        <p:style>
+          <a:lnRef idx="1">
+            <a:schemeClr val="accent1"/>
+          </a:lnRef>
+          <a:fillRef idx="0">
+            <a:schemeClr val="accent1"/>
+          </a:fillRef>
+          <a:effectRef idx="0">
+            <a:schemeClr val="accent1"/>
+          </a:effectRef>
+          <a:fontRef idx="minor">
+            <a:schemeClr val="tx1"/>
+          </a:fontRef>
+        </p:style>
+      </p:cxnSp>
+      <p:cxnSp>
+        <p:nvCxnSpPr>
+          <p:cNvPr id="13" name="Straight Arrow Connector 12">
+            <a:extLst>
+              <a:ext uri="{FF2B5EF4-FFF2-40B4-BE49-F238E27FC236}">
+                <a16:creationId xmlns:a16="http://schemas.microsoft.com/office/drawing/2014/main" id="{9A8B4F7F-6128-156A-2298-8BB9FA9E83FC}"/>
+              </a:ext>
+            </a:extLst>
+          </p:cNvPr>
+          <p:cNvCxnSpPr>
+            <a:cxnSpLocks/>
+            <a:stCxn id="6" idx="2"/>
+            <a:endCxn id="7" idx="0"/>
+          </p:cNvCxnSpPr>
+          <p:nvPr/>
+        </p:nvCxnSpPr>
+        <p:spPr>
+          <a:xfrm>
+            <a:off x="8555371" y="3613264"/>
+            <a:ext cx="1179085" cy="746150"/>
+          </a:xfrm>
+          <a:prstGeom prst="straightConnector1">
+            <a:avLst/>
+          </a:prstGeom>
+          <a:ln w="38100">
+            <a:solidFill>
+              <a:schemeClr val="tx1"/>
+            </a:solidFill>
+            <a:tailEnd type="triangle"/>
+          </a:ln>
+        </p:spPr>
+        <p:style>
+          <a:lnRef idx="1">
+            <a:schemeClr val="accent1"/>
+          </a:lnRef>
+          <a:fillRef idx="0">
+            <a:schemeClr val="accent1"/>
+          </a:fillRef>
+          <a:effectRef idx="0">
+            <a:schemeClr val="accent1"/>
+          </a:effectRef>
+          <a:fontRef idx="minor">
+            <a:schemeClr val="tx1"/>
+          </a:fontRef>
+        </p:style>
+      </p:cxnSp>
+      <p:cxnSp>
+        <p:nvCxnSpPr>
+          <p:cNvPr id="16" name="Straight Arrow Connector 15">
+            <a:extLst>
+              <a:ext uri="{FF2B5EF4-FFF2-40B4-BE49-F238E27FC236}">
+                <a16:creationId xmlns:a16="http://schemas.microsoft.com/office/drawing/2014/main" id="{D898D381-A355-28EB-35CB-27F04345726F}"/>
+              </a:ext>
+            </a:extLst>
+          </p:cNvPr>
+          <p:cNvCxnSpPr>
+            <a:cxnSpLocks/>
+            <a:stCxn id="5" idx="2"/>
+            <a:endCxn id="7" idx="0"/>
+          </p:cNvCxnSpPr>
+          <p:nvPr/>
+        </p:nvCxnSpPr>
+        <p:spPr>
+          <a:xfrm flipH="1">
+            <a:off x="9734456" y="3613264"/>
+            <a:ext cx="1159383" cy="746150"/>
+          </a:xfrm>
+          <a:prstGeom prst="straightConnector1">
+            <a:avLst/>
+          </a:prstGeom>
+          <a:ln w="38100">
+            <a:solidFill>
+              <a:schemeClr val="tx1"/>
+            </a:solidFill>
+            <a:tailEnd type="triangle"/>
+          </a:ln>
+        </p:spPr>
+        <p:style>
+          <a:lnRef idx="1">
+            <a:schemeClr val="accent1"/>
+          </a:lnRef>
+          <a:fillRef idx="0">
+            <a:schemeClr val="accent1"/>
+          </a:fillRef>
+          <a:effectRef idx="0">
+            <a:schemeClr val="accent1"/>
+          </a:effectRef>
+          <a:fontRef idx="minor">
+            <a:schemeClr val="tx1"/>
+          </a:fontRef>
+        </p:style>
+      </p:cxnSp>
+    </p:spTree>
+    <p:extLst>
+      <p:ext uri="{BB962C8B-B14F-4D97-AF65-F5344CB8AC3E}">
+        <p14:creationId xmlns:p14="http://schemas.microsoft.com/office/powerpoint/2010/main" val="3931824065"/>
+      </p:ext>
+    </p:extLst>
+  </p:cSld>
+  <p:clrMapOvr>
+    <a:masterClrMapping/>
+  </p:clrMapOvr>
+</p:sld>
+</file>
+
+<file path=ppt/slides/slide4.xml><?xml version="1.0" encoding="utf-8"?>
+<p:sld xmlns:a="http://schemas.openxmlformats.org/drawingml/2006/main" xmlns:r="http://schemas.openxmlformats.org/officeDocument/2006/relationships" xmlns:p="http://schemas.openxmlformats.org/presentationml/2006/main">
+  <p:cSld>
+    <p:spTree>
+      <p:nvGrpSpPr>
+        <p:cNvPr id="1" name="">
+          <a:extLst>
+            <a:ext uri="{FF2B5EF4-FFF2-40B4-BE49-F238E27FC236}">
+              <a16:creationId xmlns:a16="http://schemas.microsoft.com/office/drawing/2014/main" id="{A49C904F-6B0E-2277-CFBE-978784BFE255}"/>
+            </a:ext>
+          </a:extLst>
+        </p:cNvPr>
+        <p:cNvGrpSpPr/>
+        <p:nvPr/>
+      </p:nvGrpSpPr>
+      <p:grpSpPr>
+        <a:xfrm>
+          <a:off x="0" y="0"/>
+          <a:ext cx="0" cy="0"/>
+          <a:chOff x="0" y="0"/>
+          <a:chExt cx="0" cy="0"/>
+        </a:xfrm>
+      </p:grpSpPr>
+      <p:sp>
+        <p:nvSpPr>
+          <p:cNvPr id="2" name="Title 1">
+            <a:extLst>
+              <a:ext uri="{FF2B5EF4-FFF2-40B4-BE49-F238E27FC236}">
+                <a16:creationId xmlns:a16="http://schemas.microsoft.com/office/drawing/2014/main" id="{9427E589-5BDE-6699-F9F3-FF57CACBCDAC}"/>
+              </a:ext>
+            </a:extLst>
+          </p:cNvPr>
+          <p:cNvSpPr>
+            <a:spLocks noGrp="1"/>
+          </p:cNvSpPr>
+          <p:nvPr>
+            <p:ph type="title"/>
+          </p:nvPr>
+        </p:nvSpPr>
+        <p:spPr>
+          <a:xfrm>
+            <a:off x="838200" y="215696"/>
+            <a:ext cx="10515600" cy="930682"/>
+          </a:xfrm>
+        </p:spPr>
+        <p:txBody>
+          <a:bodyPr>
+            <a:normAutofit/>
+          </a:bodyPr>
+          <a:lstStyle/>
+          <a:p>
+            <a:r>
+              <a:rPr lang="en-US" sz="4000" dirty="0">
+                <a:latin typeface="+mn-lt"/>
+              </a:rPr>
+              <a:t>Introduction to Web Searching</a:t>
+            </a:r>
+          </a:p>
+        </p:txBody>
+      </p:sp>
+      <p:sp>
+        <p:nvSpPr>
+          <p:cNvPr id="3" name="Content Placeholder 2">
+            <a:extLst>
+              <a:ext uri="{FF2B5EF4-FFF2-40B4-BE49-F238E27FC236}">
+                <a16:creationId xmlns:a16="http://schemas.microsoft.com/office/drawing/2014/main" id="{4BC69A5A-4E55-96BE-1039-71C8305C3B04}"/>
+              </a:ext>
+            </a:extLst>
+          </p:cNvPr>
+          <p:cNvSpPr>
+            <a:spLocks noGrp="1"/>
+          </p:cNvSpPr>
+          <p:nvPr>
+            <p:ph idx="1"/>
+          </p:nvPr>
+        </p:nvSpPr>
+        <p:spPr>
+          <a:xfrm>
+            <a:off x="838200" y="1183037"/>
+            <a:ext cx="10515600" cy="5372745"/>
+          </a:xfrm>
+        </p:spPr>
+        <p:txBody>
+          <a:bodyPr>
+            <a:normAutofit/>
+          </a:bodyPr>
+          <a:lstStyle/>
+          <a:p>
+            <a:pPr marL="0" indent="0">
+              <a:buNone/>
+            </a:pPr>
+            <a:r>
+              <a:rPr lang="en-US" dirty="0"/>
+              <a:t>Many pitfalls in web search</a:t>
+            </a:r>
+          </a:p>
+          <a:p>
+            <a:r>
+              <a:rPr lang="en-US" dirty="0"/>
+              <a:t>Limited length query may not incorporate semantics and context</a:t>
+            </a:r>
+          </a:p>
+          <a:p>
+            <a:r>
+              <a:rPr lang="en-US" dirty="0"/>
+              <a:t>Natural language used for query is often ambiguous </a:t>
+            </a:r>
+          </a:p>
+          <a:p>
+            <a:pPr lvl="1"/>
+            <a:r>
+              <a:rPr lang="en-US" dirty="0"/>
+              <a:t>Example: Query for ‘</a:t>
+            </a:r>
+            <a:r>
+              <a:rPr lang="en-US" i="1" dirty="0"/>
+              <a:t>Jaguar numbers</a:t>
+            </a:r>
+            <a:r>
+              <a:rPr lang="en-US" dirty="0"/>
+              <a:t>’ could refer to an endangered large cat, an automobile, a sports team, or maybe something else??</a:t>
+            </a:r>
+          </a:p>
+          <a:p>
+            <a:r>
+              <a:rPr lang="en-US" dirty="0"/>
+              <a:t>Keywords are not unique to a topic</a:t>
+            </a:r>
+          </a:p>
+          <a:p>
+            <a:pPr lvl="1"/>
+            <a:r>
+              <a:rPr lang="en-US" dirty="0"/>
+              <a:t>Example: ‘</a:t>
+            </a:r>
+            <a:r>
+              <a:rPr lang="en-US" i="1" dirty="0"/>
+              <a:t>Ban</a:t>
+            </a:r>
+            <a:r>
+              <a:rPr lang="en-US" dirty="0"/>
+              <a:t>k’ can refer to a </a:t>
+            </a:r>
+            <a:r>
+              <a:rPr lang="en-US" i="1" dirty="0"/>
+              <a:t>financial institution</a:t>
+            </a:r>
+            <a:r>
+              <a:rPr lang="en-US" dirty="0"/>
+              <a:t>, the </a:t>
+            </a:r>
+            <a:r>
+              <a:rPr lang="en-US" i="1" dirty="0"/>
+              <a:t>edge of river</a:t>
+            </a:r>
+            <a:r>
+              <a:rPr lang="en-US" dirty="0"/>
+              <a:t>, or the </a:t>
+            </a:r>
+            <a:r>
+              <a:rPr lang="en-US" i="1" dirty="0"/>
+              <a:t>an aircraft maneuver, …  </a:t>
+            </a:r>
+          </a:p>
+          <a:p>
+            <a:r>
+              <a:rPr lang="en-US" dirty="0"/>
+              <a:t>Keywords have synonyms</a:t>
+            </a:r>
+          </a:p>
+          <a:p>
+            <a:pPr lvl="1"/>
+            <a:r>
+              <a:rPr lang="en-US" dirty="0"/>
+              <a:t>Example of two queries with different key words but identical </a:t>
+            </a:r>
+            <a:r>
+              <a:rPr lang="en-US" dirty="0" err="1"/>
+              <a:t>symantics</a:t>
+            </a:r>
+            <a:r>
+              <a:rPr lang="en-US" dirty="0"/>
+              <a:t> </a:t>
+            </a:r>
+          </a:p>
+          <a:p>
+            <a:pPr marL="457200" lvl="1" indent="0" algn="ctr">
+              <a:buNone/>
+            </a:pPr>
+            <a:r>
+              <a:rPr lang="en-US" dirty="0"/>
+              <a:t>“</a:t>
+            </a:r>
+            <a:r>
+              <a:rPr lang="en-US" i="1" dirty="0"/>
+              <a:t>What has been the loss of </a:t>
+            </a:r>
+            <a:r>
+              <a:rPr lang="en-US" b="1" i="1" dirty="0">
+                <a:solidFill>
+                  <a:srgbClr val="C00000"/>
+                </a:solidFill>
+              </a:rPr>
+              <a:t>farm land </a:t>
+            </a:r>
+            <a:r>
+              <a:rPr lang="en-US" i="1" dirty="0"/>
+              <a:t>in the US in 2024</a:t>
+            </a:r>
+            <a:r>
+              <a:rPr lang="en-US" dirty="0"/>
+              <a:t>”    </a:t>
+            </a:r>
+          </a:p>
+          <a:p>
+            <a:pPr marL="457200" lvl="1" indent="0" algn="ctr">
+              <a:buNone/>
+            </a:pPr>
+            <a:r>
+              <a:rPr lang="en-US" dirty="0"/>
+              <a:t>“</a:t>
+            </a:r>
+            <a:r>
+              <a:rPr lang="en-US" i="1" dirty="0"/>
+              <a:t>How many </a:t>
+            </a:r>
+            <a:r>
+              <a:rPr lang="en-US" b="1" i="1" dirty="0">
+                <a:solidFill>
+                  <a:srgbClr val="C00000"/>
+                </a:solidFill>
+              </a:rPr>
+              <a:t>cultivated acers </a:t>
+            </a:r>
+            <a:r>
+              <a:rPr lang="en-US" i="1" dirty="0"/>
+              <a:t>were lost in the US </a:t>
+            </a:r>
+            <a:r>
+              <a:rPr lang="en-US" i="1" dirty="0" err="1"/>
+              <a:t>durring</a:t>
+            </a:r>
+            <a:r>
+              <a:rPr lang="en-US" i="1" dirty="0"/>
+              <a:t> 2024</a:t>
+            </a:r>
+            <a:r>
+              <a:rPr lang="en-US" dirty="0"/>
+              <a:t>”</a:t>
+            </a:r>
+          </a:p>
+          <a:p>
+            <a:pPr lvl="1"/>
+            <a:endParaRPr lang="en-US" dirty="0"/>
           </a:p>
         </p:txBody>
       </p:sp>
     </p:spTree>
     <p:extLst>
       <p:ext uri="{BB962C8B-B14F-4D97-AF65-F5344CB8AC3E}">
-        <p14:creationId xmlns:p14="http://schemas.microsoft.com/office/powerpoint/2010/main" val="3931824065"/>
+        <p14:creationId xmlns:p14="http://schemas.microsoft.com/office/powerpoint/2010/main" val="643151138"/>
+      </p:ext>
+    </p:extLst>
+  </p:cSld>
+  <p:clrMapOvr>
+    <a:masterClrMapping/>
+  </p:clrMapOvr>
+  <p:timing>
+    <p:tnLst>
+      <p:par>
+        <p:cTn id="1" dur="indefinite" restart="never" nodeType="tmRoot">
+          <p:childTnLst>
+            <p:seq concurrent="1" nextAc="seek">
+              <p:cTn id="2" dur="indefinite" nodeType="mainSeq">
+                <p:childTnLst>
+                  <p:par>
+                    <p:cTn id="3" fill="hold">
+                      <p:stCondLst>
+                        <p:cond delay="indefinite"/>
+                      </p:stCondLst>
+                      <p:childTnLst>
+                        <p:par>
+                          <p:cTn id="4" fill="hold">
+                            <p:stCondLst>
+                              <p:cond delay="0"/>
+                            </p:stCondLst>
+                            <p:childTnLst>
+                              <p:par>
+                                <p:cTn id="5" presetID="1" presetClass="entr" presetSubtype="0" fill="hold" nodeType="clickEffect">
+                                  <p:stCondLst>
+                                    <p:cond delay="0"/>
+                                  </p:stCondLst>
+                                  <p:childTnLst>
+                                    <p:set>
+                                      <p:cBhvr>
+                                        <p:cTn id="6" dur="1" fill="hold">
+                                          <p:stCondLst>
+                                            <p:cond delay="0"/>
+                                          </p:stCondLst>
+                                        </p:cTn>
+                                        <p:tgtEl>
+                                          <p:spTgt spid="3">
+                                            <p:txEl>
+                                              <p:pRg st="1" end="1"/>
+                                            </p:txEl>
+                                          </p:spTgt>
+                                        </p:tgtEl>
+                                        <p:attrNameLst>
+                                          <p:attrName>style.visibility</p:attrName>
+                                        </p:attrNameLst>
+                                      </p:cBhvr>
+                                      <p:to>
+                                        <p:strVal val="visible"/>
+                                      </p:to>
+                                    </p:set>
+                                  </p:childTnLst>
+                                </p:cTn>
+                              </p:par>
+                            </p:childTnLst>
+                          </p:cTn>
+                        </p:par>
+                      </p:childTnLst>
+                    </p:cTn>
+                  </p:par>
+                  <p:par>
+                    <p:cTn id="7" fill="hold">
+                      <p:stCondLst>
+                        <p:cond delay="indefinite"/>
+                      </p:stCondLst>
+                      <p:childTnLst>
+                        <p:par>
+                          <p:cTn id="8" fill="hold">
+                            <p:stCondLst>
+                              <p:cond delay="0"/>
+                            </p:stCondLst>
+                            <p:childTnLst>
+                              <p:par>
+                                <p:cTn id="9" presetID="1" presetClass="entr" presetSubtype="0" fill="hold" nodeType="clickEffect">
+                                  <p:stCondLst>
+                                    <p:cond delay="0"/>
+                                  </p:stCondLst>
+                                  <p:childTnLst>
+                                    <p:set>
+                                      <p:cBhvr>
+                                        <p:cTn id="10" dur="1" fill="hold">
+                                          <p:stCondLst>
+                                            <p:cond delay="0"/>
+                                          </p:stCondLst>
+                                        </p:cTn>
+                                        <p:tgtEl>
+                                          <p:spTgt spid="3">
+                                            <p:txEl>
+                                              <p:pRg st="2" end="2"/>
+                                            </p:txEl>
+                                          </p:spTgt>
+                                        </p:tgtEl>
+                                        <p:attrNameLst>
+                                          <p:attrName>style.visibility</p:attrName>
+                                        </p:attrNameLst>
+                                      </p:cBhvr>
+                                      <p:to>
+                                        <p:strVal val="visible"/>
+                                      </p:to>
+                                    </p:set>
+                                  </p:childTnLst>
+                                </p:cTn>
+                              </p:par>
+                              <p:par>
+                                <p:cTn id="11" presetID="1" presetClass="entr" presetSubtype="0" fill="hold" nodeType="withEffect">
+                                  <p:stCondLst>
+                                    <p:cond delay="0"/>
+                                  </p:stCondLst>
+                                  <p:childTnLst>
+                                    <p:set>
+                                      <p:cBhvr>
+                                        <p:cTn id="12" dur="1" fill="hold">
+                                          <p:stCondLst>
+                                            <p:cond delay="0"/>
+                                          </p:stCondLst>
+                                        </p:cTn>
+                                        <p:tgtEl>
+                                          <p:spTgt spid="3">
+                                            <p:txEl>
+                                              <p:pRg st="3" end="3"/>
+                                            </p:txEl>
+                                          </p:spTgt>
+                                        </p:tgtEl>
+                                        <p:attrNameLst>
+                                          <p:attrName>style.visibility</p:attrName>
+                                        </p:attrNameLst>
+                                      </p:cBhvr>
+                                      <p:to>
+                                        <p:strVal val="visible"/>
+                                      </p:to>
+                                    </p:set>
+                                  </p:childTnLst>
+                                </p:cTn>
+                              </p:par>
+                            </p:childTnLst>
+                          </p:cTn>
+                        </p:par>
+                      </p:childTnLst>
+                    </p:cTn>
+                  </p:par>
+                  <p:par>
+                    <p:cTn id="13" fill="hold">
+                      <p:stCondLst>
+                        <p:cond delay="indefinite"/>
+                      </p:stCondLst>
+                      <p:childTnLst>
+                        <p:par>
+                          <p:cTn id="14" fill="hold">
+                            <p:stCondLst>
+                              <p:cond delay="0"/>
+                            </p:stCondLst>
+                            <p:childTnLst>
+                              <p:par>
+                                <p:cTn id="15" presetID="1" presetClass="entr" presetSubtype="0" fill="hold" nodeType="clickEffect">
+                                  <p:stCondLst>
+                                    <p:cond delay="0"/>
+                                  </p:stCondLst>
+                                  <p:childTnLst>
+                                    <p:set>
+                                      <p:cBhvr>
+                                        <p:cTn id="16" dur="1" fill="hold">
+                                          <p:stCondLst>
+                                            <p:cond delay="0"/>
+                                          </p:stCondLst>
+                                        </p:cTn>
+                                        <p:tgtEl>
+                                          <p:spTgt spid="3">
+                                            <p:txEl>
+                                              <p:pRg st="4" end="4"/>
+                                            </p:txEl>
+                                          </p:spTgt>
+                                        </p:tgtEl>
+                                        <p:attrNameLst>
+                                          <p:attrName>style.visibility</p:attrName>
+                                        </p:attrNameLst>
+                                      </p:cBhvr>
+                                      <p:to>
+                                        <p:strVal val="visible"/>
+                                      </p:to>
+                                    </p:set>
+                                  </p:childTnLst>
+                                </p:cTn>
+                              </p:par>
+                              <p:par>
+                                <p:cTn id="17" presetID="1" presetClass="entr" presetSubtype="0" fill="hold" nodeType="withEffect">
+                                  <p:stCondLst>
+                                    <p:cond delay="0"/>
+                                  </p:stCondLst>
+                                  <p:childTnLst>
+                                    <p:set>
+                                      <p:cBhvr>
+                                        <p:cTn id="18" dur="1" fill="hold">
+                                          <p:stCondLst>
+                                            <p:cond delay="0"/>
+                                          </p:stCondLst>
+                                        </p:cTn>
+                                        <p:tgtEl>
+                                          <p:spTgt spid="3">
+                                            <p:txEl>
+                                              <p:pRg st="5" end="5"/>
+                                            </p:txEl>
+                                          </p:spTgt>
+                                        </p:tgtEl>
+                                        <p:attrNameLst>
+                                          <p:attrName>style.visibility</p:attrName>
+                                        </p:attrNameLst>
+                                      </p:cBhvr>
+                                      <p:to>
+                                        <p:strVal val="visible"/>
+                                      </p:to>
+                                    </p:set>
+                                  </p:childTnLst>
+                                </p:cTn>
+                              </p:par>
+                            </p:childTnLst>
+                          </p:cTn>
+                        </p:par>
+                      </p:childTnLst>
+                    </p:cTn>
+                  </p:par>
+                  <p:par>
+                    <p:cTn id="19" fill="hold">
+                      <p:stCondLst>
+                        <p:cond delay="indefinite"/>
+                      </p:stCondLst>
+                      <p:childTnLst>
+                        <p:par>
+                          <p:cTn id="20" fill="hold">
+                            <p:stCondLst>
+                              <p:cond delay="0"/>
+                            </p:stCondLst>
+                            <p:childTnLst>
+                              <p:par>
+                                <p:cTn id="21" presetID="1" presetClass="entr" presetSubtype="0" fill="hold" nodeType="clickEffect">
+                                  <p:stCondLst>
+                                    <p:cond delay="0"/>
+                                  </p:stCondLst>
+                                  <p:childTnLst>
+                                    <p:set>
+                                      <p:cBhvr>
+                                        <p:cTn id="22" dur="1" fill="hold">
+                                          <p:stCondLst>
+                                            <p:cond delay="0"/>
+                                          </p:stCondLst>
+                                        </p:cTn>
+                                        <p:tgtEl>
+                                          <p:spTgt spid="3">
+                                            <p:txEl>
+                                              <p:pRg st="6" end="6"/>
+                                            </p:txEl>
+                                          </p:spTgt>
+                                        </p:tgtEl>
+                                        <p:attrNameLst>
+                                          <p:attrName>style.visibility</p:attrName>
+                                        </p:attrNameLst>
+                                      </p:cBhvr>
+                                      <p:to>
+                                        <p:strVal val="visible"/>
+                                      </p:to>
+                                    </p:set>
+                                  </p:childTnLst>
+                                </p:cTn>
+                              </p:par>
+                              <p:par>
+                                <p:cTn id="23" presetID="1" presetClass="entr" presetSubtype="0" fill="hold" nodeType="withEffect">
+                                  <p:stCondLst>
+                                    <p:cond delay="0"/>
+                                  </p:stCondLst>
+                                  <p:childTnLst>
+                                    <p:set>
+                                      <p:cBhvr>
+                                        <p:cTn id="24" dur="1" fill="hold">
+                                          <p:stCondLst>
+                                            <p:cond delay="0"/>
+                                          </p:stCondLst>
+                                        </p:cTn>
+                                        <p:tgtEl>
+                                          <p:spTgt spid="3">
+                                            <p:txEl>
+                                              <p:pRg st="7" end="7"/>
+                                            </p:txEl>
+                                          </p:spTgt>
+                                        </p:tgtEl>
+                                        <p:attrNameLst>
+                                          <p:attrName>style.visibility</p:attrName>
+                                        </p:attrNameLst>
+                                      </p:cBhvr>
+                                      <p:to>
+                                        <p:strVal val="visible"/>
+                                      </p:to>
+                                    </p:set>
+                                  </p:childTnLst>
+                                </p:cTn>
+                              </p:par>
+                              <p:par>
+                                <p:cTn id="25" presetID="1" presetClass="entr" presetSubtype="0" fill="hold" nodeType="withEffect">
+                                  <p:stCondLst>
+                                    <p:cond delay="0"/>
+                                  </p:stCondLst>
+                                  <p:childTnLst>
+                                    <p:set>
+                                      <p:cBhvr>
+                                        <p:cTn id="26" dur="1" fill="hold">
+                                          <p:stCondLst>
+                                            <p:cond delay="0"/>
+                                          </p:stCondLst>
+                                        </p:cTn>
+                                        <p:tgtEl>
+                                          <p:spTgt spid="3">
+                                            <p:txEl>
+                                              <p:pRg st="8" end="8"/>
+                                            </p:txEl>
+                                          </p:spTgt>
+                                        </p:tgtEl>
+                                        <p:attrNameLst>
+                                          <p:attrName>style.visibility</p:attrName>
+                                        </p:attrNameLst>
+                                      </p:cBhvr>
+                                      <p:to>
+                                        <p:strVal val="visible"/>
+                                      </p:to>
+                                    </p:set>
+                                  </p:childTnLst>
+                                </p:cTn>
+                              </p:par>
+                              <p:par>
+                                <p:cTn id="27" presetID="1" presetClass="entr" presetSubtype="0" fill="hold" nodeType="withEffect">
+                                  <p:stCondLst>
+                                    <p:cond delay="0"/>
+                                  </p:stCondLst>
+                                  <p:childTnLst>
+                                    <p:set>
+                                      <p:cBhvr>
+                                        <p:cTn id="28" dur="1" fill="hold">
+                                          <p:stCondLst>
+                                            <p:cond delay="0"/>
+                                          </p:stCondLst>
+                                        </p:cTn>
+                                        <p:tgtEl>
+                                          <p:spTgt spid="3">
+                                            <p:txEl>
+                                              <p:pRg st="9" end="9"/>
+                                            </p:txEl>
+                                          </p:spTgt>
+                                        </p:tgtEl>
+                                        <p:attrNameLst>
+                                          <p:attrName>style.visibility</p:attrName>
+                                        </p:attrNameLst>
+                                      </p:cBhvr>
+                                      <p:to>
+                                        <p:strVal val="visible"/>
+                                      </p:to>
+                                    </p:set>
+                                  </p:childTnLst>
+                                </p:cTn>
+                              </p:par>
+                            </p:childTnLst>
+                          </p:cTn>
+                        </p:par>
+                      </p:childTnLst>
+                    </p:cTn>
+                  </p:par>
+                </p:childTnLst>
+              </p:cTn>
+              <p:prevCondLst>
+                <p:cond evt="onPrev" delay="0">
+                  <p:tgtEl>
+                    <p:sldTgt/>
+                  </p:tgtEl>
+                </p:cond>
+              </p:prevCondLst>
+              <p:nextCondLst>
+                <p:cond evt="onNext" delay="0">
+                  <p:tgtEl>
+                    <p:sldTgt/>
+                  </p:tgtEl>
+                </p:cond>
+              </p:nextCondLst>
+            </p:seq>
+          </p:childTnLst>
+        </p:cTn>
+      </p:par>
+    </p:tnLst>
+  </p:timing>
+</p:sld>
+</file>
+
+<file path=ppt/slides/slide40.xml><?xml version="1.0" encoding="utf-8"?>
+<p:sld xmlns:a="http://schemas.openxmlformats.org/drawingml/2006/main" xmlns:r="http://schemas.openxmlformats.org/officeDocument/2006/relationships" xmlns:p="http://schemas.openxmlformats.org/presentationml/2006/main">
+  <p:cSld>
+    <p:spTree>
+      <p:nvGrpSpPr>
+        <p:cNvPr id="1" name="">
+          <a:extLst>
+            <a:ext uri="{FF2B5EF4-FFF2-40B4-BE49-F238E27FC236}">
+              <a16:creationId xmlns:a16="http://schemas.microsoft.com/office/drawing/2014/main" id="{D35B9C05-0B4F-C9DA-FC9C-C39DEFDD07FC}"/>
+            </a:ext>
+          </a:extLst>
+        </p:cNvPr>
+        <p:cNvGrpSpPr/>
+        <p:nvPr/>
+      </p:nvGrpSpPr>
+      <p:grpSpPr>
+        <a:xfrm>
+          <a:off x="0" y="0"/>
+          <a:ext cx="0" cy="0"/>
+          <a:chOff x="0" y="0"/>
+          <a:chExt cx="0" cy="0"/>
+        </a:xfrm>
+      </p:grpSpPr>
+      <p:sp>
+        <p:nvSpPr>
+          <p:cNvPr id="3" name="Content Placeholder 2">
+            <a:extLst>
+              <a:ext uri="{FF2B5EF4-FFF2-40B4-BE49-F238E27FC236}">
+                <a16:creationId xmlns:a16="http://schemas.microsoft.com/office/drawing/2014/main" id="{1294B811-C53E-5CCE-958D-F3474DAB799C}"/>
+              </a:ext>
+            </a:extLst>
+          </p:cNvPr>
+          <p:cNvSpPr>
+            <a:spLocks noGrp="1"/>
+          </p:cNvSpPr>
+          <p:nvPr>
+            <p:ph idx="1"/>
+          </p:nvPr>
+        </p:nvSpPr>
+        <p:spPr>
+          <a:xfrm>
+            <a:off x="838200" y="1110712"/>
+            <a:ext cx="10515600" cy="5405041"/>
+          </a:xfrm>
+        </p:spPr>
+        <p:txBody>
+          <a:bodyPr>
+            <a:normAutofit lnSpcReduction="10000"/>
+          </a:bodyPr>
+          <a:lstStyle/>
+          <a:p>
+            <a:pPr marL="0" indent="0">
+              <a:buNone/>
+            </a:pPr>
+            <a:r>
+              <a:rPr lang="en-US" dirty="0"/>
+              <a:t>There are several possibilities to create retriever-ranker pipelines  </a:t>
+            </a:r>
+          </a:p>
+          <a:p>
+            <a:r>
+              <a:rPr lang="en-US" dirty="0"/>
+              <a:t>Sparse vector retriever followed by cross encoder transformer model   </a:t>
+            </a:r>
+          </a:p>
+          <a:p>
+            <a:pPr lvl="1"/>
+            <a:r>
+              <a:rPr lang="en-US" dirty="0"/>
+              <a:t>Sparse retriever creates filtered set of candidate documents based on keywords </a:t>
+            </a:r>
+          </a:p>
+          <a:p>
+            <a:pPr lvl="1"/>
+            <a:r>
+              <a:rPr lang="en-US" dirty="0" err="1"/>
+              <a:t>Reranker</a:t>
+            </a:r>
+            <a:r>
+              <a:rPr lang="en-US" dirty="0"/>
+              <a:t> performs exhaustive pairwise search between candidate documents and query     </a:t>
+            </a:r>
+          </a:p>
+          <a:p>
+            <a:r>
+              <a:rPr lang="en-US" dirty="0"/>
+              <a:t>Dense vector retriever followed by sparse vector receiver </a:t>
+            </a:r>
+          </a:p>
+          <a:p>
+            <a:pPr lvl="1"/>
+            <a:r>
+              <a:rPr lang="en-US" dirty="0"/>
+              <a:t>Efficient ANNS used to find candidate document set</a:t>
+            </a:r>
+          </a:p>
+          <a:p>
+            <a:pPr lvl="1"/>
+            <a:r>
+              <a:rPr lang="en-US" dirty="0"/>
+              <a:t>Sparse vector receiver filters and </a:t>
+            </a:r>
+            <a:r>
+              <a:rPr lang="en-US" dirty="0" err="1"/>
+              <a:t>reranks</a:t>
+            </a:r>
+            <a:r>
+              <a:rPr lang="en-US" dirty="0"/>
+              <a:t> candidate documents</a:t>
+            </a:r>
+          </a:p>
+          <a:p>
+            <a:r>
+              <a:rPr lang="en-US" dirty="0"/>
+              <a:t>Dense vector retriever followed by cross encoder transformer model   </a:t>
+            </a:r>
+          </a:p>
+          <a:p>
+            <a:pPr lvl="1"/>
+            <a:r>
+              <a:rPr lang="en-US" dirty="0"/>
+              <a:t>Efficient ANNS used to find candidate document set</a:t>
+            </a:r>
+          </a:p>
+          <a:p>
+            <a:pPr lvl="1"/>
+            <a:r>
+              <a:rPr lang="en-US" dirty="0" err="1"/>
+              <a:t>Reranker</a:t>
+            </a:r>
+            <a:r>
+              <a:rPr lang="en-US" dirty="0"/>
+              <a:t> performs exhaustive pairwise search between candidate documents and query     </a:t>
+            </a:r>
+          </a:p>
+          <a:p>
+            <a:r>
+              <a:rPr lang="en-US" dirty="0" err="1"/>
+              <a:t>Etc</a:t>
+            </a:r>
+            <a:r>
+              <a:rPr lang="en-US" dirty="0"/>
+              <a:t>…</a:t>
+            </a:r>
+          </a:p>
+        </p:txBody>
+      </p:sp>
+      <p:sp>
+        <p:nvSpPr>
+          <p:cNvPr id="4" name="Title 1">
+            <a:extLst>
+              <a:ext uri="{FF2B5EF4-FFF2-40B4-BE49-F238E27FC236}">
+                <a16:creationId xmlns:a16="http://schemas.microsoft.com/office/drawing/2014/main" id="{3D7F9355-DC65-78D8-0E79-6909AB21EABB}"/>
+              </a:ext>
+            </a:extLst>
+          </p:cNvPr>
+          <p:cNvSpPr>
+            <a:spLocks noGrp="1"/>
+          </p:cNvSpPr>
+          <p:nvPr>
+            <p:ph type="title"/>
+          </p:nvPr>
+        </p:nvSpPr>
+        <p:spPr>
+          <a:xfrm>
+            <a:off x="744894" y="290480"/>
+            <a:ext cx="10515600" cy="628585"/>
+          </a:xfrm>
+        </p:spPr>
+        <p:txBody>
+          <a:bodyPr>
+            <a:normAutofit fontScale="90000"/>
+          </a:bodyPr>
+          <a:lstStyle/>
+          <a:p>
+            <a:r>
+              <a:rPr lang="en-US" dirty="0">
+                <a:latin typeface="+mn-lt"/>
+              </a:rPr>
+              <a:t>Sparse-Dense Pipelines</a:t>
+            </a:r>
+          </a:p>
+        </p:txBody>
+      </p:sp>
+    </p:spTree>
+    <p:extLst>
+      <p:ext uri="{BB962C8B-B14F-4D97-AF65-F5344CB8AC3E}">
+        <p14:creationId xmlns:p14="http://schemas.microsoft.com/office/powerpoint/2010/main" val="1675190968"/>
       </p:ext>
     </p:extLst>
   </p:cSld>
@@ -29291,658 +30751,7 @@
 </p:sld>
 </file>
 
-<file path=ppt/slides/slide4.xml><?xml version="1.0" encoding="utf-8"?>
-<p:sld xmlns:a="http://schemas.openxmlformats.org/drawingml/2006/main" xmlns:r="http://schemas.openxmlformats.org/officeDocument/2006/relationships" xmlns:p="http://schemas.openxmlformats.org/presentationml/2006/main">
-  <p:cSld>
-    <p:spTree>
-      <p:nvGrpSpPr>
-        <p:cNvPr id="1" name="">
-          <a:extLst>
-            <a:ext uri="{FF2B5EF4-FFF2-40B4-BE49-F238E27FC236}">
-              <a16:creationId xmlns:a16="http://schemas.microsoft.com/office/drawing/2014/main" id="{A49C904F-6B0E-2277-CFBE-978784BFE255}"/>
-            </a:ext>
-          </a:extLst>
-        </p:cNvPr>
-        <p:cNvGrpSpPr/>
-        <p:nvPr/>
-      </p:nvGrpSpPr>
-      <p:grpSpPr>
-        <a:xfrm>
-          <a:off x="0" y="0"/>
-          <a:ext cx="0" cy="0"/>
-          <a:chOff x="0" y="0"/>
-          <a:chExt cx="0" cy="0"/>
-        </a:xfrm>
-      </p:grpSpPr>
-      <p:sp>
-        <p:nvSpPr>
-          <p:cNvPr id="2" name="Title 1">
-            <a:extLst>
-              <a:ext uri="{FF2B5EF4-FFF2-40B4-BE49-F238E27FC236}">
-                <a16:creationId xmlns:a16="http://schemas.microsoft.com/office/drawing/2014/main" id="{9427E589-5BDE-6699-F9F3-FF57CACBCDAC}"/>
-              </a:ext>
-            </a:extLst>
-          </p:cNvPr>
-          <p:cNvSpPr>
-            <a:spLocks noGrp="1"/>
-          </p:cNvSpPr>
-          <p:nvPr>
-            <p:ph type="title"/>
-          </p:nvPr>
-        </p:nvSpPr>
-        <p:spPr>
-          <a:xfrm>
-            <a:off x="838200" y="215696"/>
-            <a:ext cx="10515600" cy="930682"/>
-          </a:xfrm>
-        </p:spPr>
-        <p:txBody>
-          <a:bodyPr>
-            <a:normAutofit/>
-          </a:bodyPr>
-          <a:lstStyle/>
-          <a:p>
-            <a:r>
-              <a:rPr lang="en-US" sz="4000" dirty="0">
-                <a:latin typeface="+mn-lt"/>
-              </a:rPr>
-              <a:t>Introduction to Web Searching</a:t>
-            </a:r>
-          </a:p>
-        </p:txBody>
-      </p:sp>
-      <p:sp>
-        <p:nvSpPr>
-          <p:cNvPr id="3" name="Content Placeholder 2">
-            <a:extLst>
-              <a:ext uri="{FF2B5EF4-FFF2-40B4-BE49-F238E27FC236}">
-                <a16:creationId xmlns:a16="http://schemas.microsoft.com/office/drawing/2014/main" id="{4BC69A5A-4E55-96BE-1039-71C8305C3B04}"/>
-              </a:ext>
-            </a:extLst>
-          </p:cNvPr>
-          <p:cNvSpPr>
-            <a:spLocks noGrp="1"/>
-          </p:cNvSpPr>
-          <p:nvPr>
-            <p:ph idx="1"/>
-          </p:nvPr>
-        </p:nvSpPr>
-        <p:spPr>
-          <a:xfrm>
-            <a:off x="838200" y="1183037"/>
-            <a:ext cx="10515600" cy="5372745"/>
-          </a:xfrm>
-        </p:spPr>
-        <p:txBody>
-          <a:bodyPr>
-            <a:normAutofit/>
-          </a:bodyPr>
-          <a:lstStyle/>
-          <a:p>
-            <a:pPr marL="0" indent="0">
-              <a:buNone/>
-            </a:pPr>
-            <a:r>
-              <a:rPr lang="en-US" dirty="0"/>
-              <a:t>Many pitfalls in web search</a:t>
-            </a:r>
-          </a:p>
-          <a:p>
-            <a:r>
-              <a:rPr lang="en-US" dirty="0"/>
-              <a:t>Limited length query may not incorporate semantics and context</a:t>
-            </a:r>
-          </a:p>
-          <a:p>
-            <a:r>
-              <a:rPr lang="en-US" dirty="0"/>
-              <a:t>Natural language used for query is often ambiguous </a:t>
-            </a:r>
-          </a:p>
-          <a:p>
-            <a:pPr lvl="1"/>
-            <a:r>
-              <a:rPr lang="en-US" dirty="0"/>
-              <a:t>Example: Query for ‘</a:t>
-            </a:r>
-            <a:r>
-              <a:rPr lang="en-US" i="1" dirty="0"/>
-              <a:t>Jaguar numbers</a:t>
-            </a:r>
-            <a:r>
-              <a:rPr lang="en-US" dirty="0"/>
-              <a:t>’ could refer to an endangered large cat, an automobile, a sports team, or maybe something else??</a:t>
-            </a:r>
-          </a:p>
-          <a:p>
-            <a:r>
-              <a:rPr lang="en-US" dirty="0"/>
-              <a:t>Keywords are not unique to a topic</a:t>
-            </a:r>
-          </a:p>
-          <a:p>
-            <a:pPr lvl="1"/>
-            <a:r>
-              <a:rPr lang="en-US" dirty="0"/>
-              <a:t>Example: ‘</a:t>
-            </a:r>
-            <a:r>
-              <a:rPr lang="en-US" i="1" dirty="0"/>
-              <a:t>Ban</a:t>
-            </a:r>
-            <a:r>
-              <a:rPr lang="en-US" dirty="0"/>
-              <a:t>k’ can refer to a </a:t>
-            </a:r>
-            <a:r>
-              <a:rPr lang="en-US" i="1" dirty="0"/>
-              <a:t>financial institution</a:t>
-            </a:r>
-            <a:r>
-              <a:rPr lang="en-US" dirty="0"/>
-              <a:t>, the </a:t>
-            </a:r>
-            <a:r>
-              <a:rPr lang="en-US" i="1" dirty="0"/>
-              <a:t>edge of river</a:t>
-            </a:r>
-            <a:r>
-              <a:rPr lang="en-US" dirty="0"/>
-              <a:t>, or the </a:t>
-            </a:r>
-            <a:r>
-              <a:rPr lang="en-US" i="1" dirty="0"/>
-              <a:t>an aircraft maneuver, …  </a:t>
-            </a:r>
-          </a:p>
-          <a:p>
-            <a:r>
-              <a:rPr lang="en-US" dirty="0"/>
-              <a:t>Keywords have synonyms</a:t>
-            </a:r>
-          </a:p>
-          <a:p>
-            <a:pPr lvl="1"/>
-            <a:r>
-              <a:rPr lang="en-US" dirty="0"/>
-              <a:t>Example of two queries with different key words but identical </a:t>
-            </a:r>
-            <a:r>
-              <a:rPr lang="en-US" dirty="0" err="1"/>
-              <a:t>symantics</a:t>
-            </a:r>
-            <a:r>
-              <a:rPr lang="en-US" dirty="0"/>
-              <a:t> </a:t>
-            </a:r>
-          </a:p>
-          <a:p>
-            <a:pPr marL="457200" lvl="1" indent="0" algn="ctr">
-              <a:buNone/>
-            </a:pPr>
-            <a:r>
-              <a:rPr lang="en-US" dirty="0"/>
-              <a:t>“</a:t>
-            </a:r>
-            <a:r>
-              <a:rPr lang="en-US" i="1" dirty="0"/>
-              <a:t>What has been the loss of </a:t>
-            </a:r>
-            <a:r>
-              <a:rPr lang="en-US" b="1" i="1" dirty="0">
-                <a:solidFill>
-                  <a:srgbClr val="C00000"/>
-                </a:solidFill>
-              </a:rPr>
-              <a:t>farm land </a:t>
-            </a:r>
-            <a:r>
-              <a:rPr lang="en-US" i="1" dirty="0"/>
-              <a:t>in the US in 2024</a:t>
-            </a:r>
-            <a:r>
-              <a:rPr lang="en-US" dirty="0"/>
-              <a:t>”    </a:t>
-            </a:r>
-          </a:p>
-          <a:p>
-            <a:pPr marL="457200" lvl="1" indent="0" algn="ctr">
-              <a:buNone/>
-            </a:pPr>
-            <a:r>
-              <a:rPr lang="en-US" dirty="0"/>
-              <a:t>“</a:t>
-            </a:r>
-            <a:r>
-              <a:rPr lang="en-US" i="1" dirty="0"/>
-              <a:t>How many </a:t>
-            </a:r>
-            <a:r>
-              <a:rPr lang="en-US" b="1" i="1" dirty="0">
-                <a:solidFill>
-                  <a:srgbClr val="C00000"/>
-                </a:solidFill>
-              </a:rPr>
-              <a:t>cultivated acers </a:t>
-            </a:r>
-            <a:r>
-              <a:rPr lang="en-US" i="1" dirty="0"/>
-              <a:t>were lost in the US </a:t>
-            </a:r>
-            <a:r>
-              <a:rPr lang="en-US" i="1" dirty="0" err="1"/>
-              <a:t>durring</a:t>
-            </a:r>
-            <a:r>
-              <a:rPr lang="en-US" i="1" dirty="0"/>
-              <a:t> 2024</a:t>
-            </a:r>
-            <a:r>
-              <a:rPr lang="en-US" dirty="0"/>
-              <a:t>”</a:t>
-            </a:r>
-          </a:p>
-          <a:p>
-            <a:pPr lvl="1"/>
-            <a:endParaRPr lang="en-US" dirty="0"/>
-          </a:p>
-        </p:txBody>
-      </p:sp>
-    </p:spTree>
-    <p:extLst>
-      <p:ext uri="{BB962C8B-B14F-4D97-AF65-F5344CB8AC3E}">
-        <p14:creationId xmlns:p14="http://schemas.microsoft.com/office/powerpoint/2010/main" val="643151138"/>
-      </p:ext>
-    </p:extLst>
-  </p:cSld>
-  <p:clrMapOvr>
-    <a:masterClrMapping/>
-  </p:clrMapOvr>
-  <p:timing>
-    <p:tnLst>
-      <p:par>
-        <p:cTn id="1" dur="indefinite" restart="never" nodeType="tmRoot">
-          <p:childTnLst>
-            <p:seq concurrent="1" nextAc="seek">
-              <p:cTn id="2" dur="indefinite" nodeType="mainSeq">
-                <p:childTnLst>
-                  <p:par>
-                    <p:cTn id="3" fill="hold">
-                      <p:stCondLst>
-                        <p:cond delay="indefinite"/>
-                      </p:stCondLst>
-                      <p:childTnLst>
-                        <p:par>
-                          <p:cTn id="4" fill="hold">
-                            <p:stCondLst>
-                              <p:cond delay="0"/>
-                            </p:stCondLst>
-                            <p:childTnLst>
-                              <p:par>
-                                <p:cTn id="5" presetID="1" presetClass="entr" presetSubtype="0" fill="hold" nodeType="clickEffect">
-                                  <p:stCondLst>
-                                    <p:cond delay="0"/>
-                                  </p:stCondLst>
-                                  <p:childTnLst>
-                                    <p:set>
-                                      <p:cBhvr>
-                                        <p:cTn id="6" dur="1" fill="hold">
-                                          <p:stCondLst>
-                                            <p:cond delay="0"/>
-                                          </p:stCondLst>
-                                        </p:cTn>
-                                        <p:tgtEl>
-                                          <p:spTgt spid="3">
-                                            <p:txEl>
-                                              <p:pRg st="1" end="1"/>
-                                            </p:txEl>
-                                          </p:spTgt>
-                                        </p:tgtEl>
-                                        <p:attrNameLst>
-                                          <p:attrName>style.visibility</p:attrName>
-                                        </p:attrNameLst>
-                                      </p:cBhvr>
-                                      <p:to>
-                                        <p:strVal val="visible"/>
-                                      </p:to>
-                                    </p:set>
-                                  </p:childTnLst>
-                                </p:cTn>
-                              </p:par>
-                            </p:childTnLst>
-                          </p:cTn>
-                        </p:par>
-                      </p:childTnLst>
-                    </p:cTn>
-                  </p:par>
-                  <p:par>
-                    <p:cTn id="7" fill="hold">
-                      <p:stCondLst>
-                        <p:cond delay="indefinite"/>
-                      </p:stCondLst>
-                      <p:childTnLst>
-                        <p:par>
-                          <p:cTn id="8" fill="hold">
-                            <p:stCondLst>
-                              <p:cond delay="0"/>
-                            </p:stCondLst>
-                            <p:childTnLst>
-                              <p:par>
-                                <p:cTn id="9" presetID="1" presetClass="entr" presetSubtype="0" fill="hold" nodeType="clickEffect">
-                                  <p:stCondLst>
-                                    <p:cond delay="0"/>
-                                  </p:stCondLst>
-                                  <p:childTnLst>
-                                    <p:set>
-                                      <p:cBhvr>
-                                        <p:cTn id="10" dur="1" fill="hold">
-                                          <p:stCondLst>
-                                            <p:cond delay="0"/>
-                                          </p:stCondLst>
-                                        </p:cTn>
-                                        <p:tgtEl>
-                                          <p:spTgt spid="3">
-                                            <p:txEl>
-                                              <p:pRg st="2" end="2"/>
-                                            </p:txEl>
-                                          </p:spTgt>
-                                        </p:tgtEl>
-                                        <p:attrNameLst>
-                                          <p:attrName>style.visibility</p:attrName>
-                                        </p:attrNameLst>
-                                      </p:cBhvr>
-                                      <p:to>
-                                        <p:strVal val="visible"/>
-                                      </p:to>
-                                    </p:set>
-                                  </p:childTnLst>
-                                </p:cTn>
-                              </p:par>
-                              <p:par>
-                                <p:cTn id="11" presetID="1" presetClass="entr" presetSubtype="0" fill="hold" nodeType="withEffect">
-                                  <p:stCondLst>
-                                    <p:cond delay="0"/>
-                                  </p:stCondLst>
-                                  <p:childTnLst>
-                                    <p:set>
-                                      <p:cBhvr>
-                                        <p:cTn id="12" dur="1" fill="hold">
-                                          <p:stCondLst>
-                                            <p:cond delay="0"/>
-                                          </p:stCondLst>
-                                        </p:cTn>
-                                        <p:tgtEl>
-                                          <p:spTgt spid="3">
-                                            <p:txEl>
-                                              <p:pRg st="3" end="3"/>
-                                            </p:txEl>
-                                          </p:spTgt>
-                                        </p:tgtEl>
-                                        <p:attrNameLst>
-                                          <p:attrName>style.visibility</p:attrName>
-                                        </p:attrNameLst>
-                                      </p:cBhvr>
-                                      <p:to>
-                                        <p:strVal val="visible"/>
-                                      </p:to>
-                                    </p:set>
-                                  </p:childTnLst>
-                                </p:cTn>
-                              </p:par>
-                            </p:childTnLst>
-                          </p:cTn>
-                        </p:par>
-                      </p:childTnLst>
-                    </p:cTn>
-                  </p:par>
-                  <p:par>
-                    <p:cTn id="13" fill="hold">
-                      <p:stCondLst>
-                        <p:cond delay="indefinite"/>
-                      </p:stCondLst>
-                      <p:childTnLst>
-                        <p:par>
-                          <p:cTn id="14" fill="hold">
-                            <p:stCondLst>
-                              <p:cond delay="0"/>
-                            </p:stCondLst>
-                            <p:childTnLst>
-                              <p:par>
-                                <p:cTn id="15" presetID="1" presetClass="entr" presetSubtype="0" fill="hold" nodeType="clickEffect">
-                                  <p:stCondLst>
-                                    <p:cond delay="0"/>
-                                  </p:stCondLst>
-                                  <p:childTnLst>
-                                    <p:set>
-                                      <p:cBhvr>
-                                        <p:cTn id="16" dur="1" fill="hold">
-                                          <p:stCondLst>
-                                            <p:cond delay="0"/>
-                                          </p:stCondLst>
-                                        </p:cTn>
-                                        <p:tgtEl>
-                                          <p:spTgt spid="3">
-                                            <p:txEl>
-                                              <p:pRg st="4" end="4"/>
-                                            </p:txEl>
-                                          </p:spTgt>
-                                        </p:tgtEl>
-                                        <p:attrNameLst>
-                                          <p:attrName>style.visibility</p:attrName>
-                                        </p:attrNameLst>
-                                      </p:cBhvr>
-                                      <p:to>
-                                        <p:strVal val="visible"/>
-                                      </p:to>
-                                    </p:set>
-                                  </p:childTnLst>
-                                </p:cTn>
-                              </p:par>
-                              <p:par>
-                                <p:cTn id="17" presetID="1" presetClass="entr" presetSubtype="0" fill="hold" nodeType="withEffect">
-                                  <p:stCondLst>
-                                    <p:cond delay="0"/>
-                                  </p:stCondLst>
-                                  <p:childTnLst>
-                                    <p:set>
-                                      <p:cBhvr>
-                                        <p:cTn id="18" dur="1" fill="hold">
-                                          <p:stCondLst>
-                                            <p:cond delay="0"/>
-                                          </p:stCondLst>
-                                        </p:cTn>
-                                        <p:tgtEl>
-                                          <p:spTgt spid="3">
-                                            <p:txEl>
-                                              <p:pRg st="5" end="5"/>
-                                            </p:txEl>
-                                          </p:spTgt>
-                                        </p:tgtEl>
-                                        <p:attrNameLst>
-                                          <p:attrName>style.visibility</p:attrName>
-                                        </p:attrNameLst>
-                                      </p:cBhvr>
-                                      <p:to>
-                                        <p:strVal val="visible"/>
-                                      </p:to>
-                                    </p:set>
-                                  </p:childTnLst>
-                                </p:cTn>
-                              </p:par>
-                            </p:childTnLst>
-                          </p:cTn>
-                        </p:par>
-                      </p:childTnLst>
-                    </p:cTn>
-                  </p:par>
-                  <p:par>
-                    <p:cTn id="19" fill="hold">
-                      <p:stCondLst>
-                        <p:cond delay="indefinite"/>
-                      </p:stCondLst>
-                      <p:childTnLst>
-                        <p:par>
-                          <p:cTn id="20" fill="hold">
-                            <p:stCondLst>
-                              <p:cond delay="0"/>
-                            </p:stCondLst>
-                            <p:childTnLst>
-                              <p:par>
-                                <p:cTn id="21" presetID="1" presetClass="entr" presetSubtype="0" fill="hold" nodeType="clickEffect">
-                                  <p:stCondLst>
-                                    <p:cond delay="0"/>
-                                  </p:stCondLst>
-                                  <p:childTnLst>
-                                    <p:set>
-                                      <p:cBhvr>
-                                        <p:cTn id="22" dur="1" fill="hold">
-                                          <p:stCondLst>
-                                            <p:cond delay="0"/>
-                                          </p:stCondLst>
-                                        </p:cTn>
-                                        <p:tgtEl>
-                                          <p:spTgt spid="3">
-                                            <p:txEl>
-                                              <p:pRg st="6" end="6"/>
-                                            </p:txEl>
-                                          </p:spTgt>
-                                        </p:tgtEl>
-                                        <p:attrNameLst>
-                                          <p:attrName>style.visibility</p:attrName>
-                                        </p:attrNameLst>
-                                      </p:cBhvr>
-                                      <p:to>
-                                        <p:strVal val="visible"/>
-                                      </p:to>
-                                    </p:set>
-                                  </p:childTnLst>
-                                </p:cTn>
-                              </p:par>
-                              <p:par>
-                                <p:cTn id="23" presetID="1" presetClass="entr" presetSubtype="0" fill="hold" nodeType="withEffect">
-                                  <p:stCondLst>
-                                    <p:cond delay="0"/>
-                                  </p:stCondLst>
-                                  <p:childTnLst>
-                                    <p:set>
-                                      <p:cBhvr>
-                                        <p:cTn id="24" dur="1" fill="hold">
-                                          <p:stCondLst>
-                                            <p:cond delay="0"/>
-                                          </p:stCondLst>
-                                        </p:cTn>
-                                        <p:tgtEl>
-                                          <p:spTgt spid="3">
-                                            <p:txEl>
-                                              <p:pRg st="7" end="7"/>
-                                            </p:txEl>
-                                          </p:spTgt>
-                                        </p:tgtEl>
-                                        <p:attrNameLst>
-                                          <p:attrName>style.visibility</p:attrName>
-                                        </p:attrNameLst>
-                                      </p:cBhvr>
-                                      <p:to>
-                                        <p:strVal val="visible"/>
-                                      </p:to>
-                                    </p:set>
-                                  </p:childTnLst>
-                                </p:cTn>
-                              </p:par>
-                              <p:par>
-                                <p:cTn id="25" presetID="1" presetClass="entr" presetSubtype="0" fill="hold" nodeType="withEffect">
-                                  <p:stCondLst>
-                                    <p:cond delay="0"/>
-                                  </p:stCondLst>
-                                  <p:childTnLst>
-                                    <p:set>
-                                      <p:cBhvr>
-                                        <p:cTn id="26" dur="1" fill="hold">
-                                          <p:stCondLst>
-                                            <p:cond delay="0"/>
-                                          </p:stCondLst>
-                                        </p:cTn>
-                                        <p:tgtEl>
-                                          <p:spTgt spid="3">
-                                            <p:txEl>
-                                              <p:pRg st="8" end="8"/>
-                                            </p:txEl>
-                                          </p:spTgt>
-                                        </p:tgtEl>
-                                        <p:attrNameLst>
-                                          <p:attrName>style.visibility</p:attrName>
-                                        </p:attrNameLst>
-                                      </p:cBhvr>
-                                      <p:to>
-                                        <p:strVal val="visible"/>
-                                      </p:to>
-                                    </p:set>
-                                  </p:childTnLst>
-                                </p:cTn>
-                              </p:par>
-                              <p:par>
-                                <p:cTn id="27" presetID="1" presetClass="entr" presetSubtype="0" fill="hold" nodeType="withEffect">
-                                  <p:stCondLst>
-                                    <p:cond delay="0"/>
-                                  </p:stCondLst>
-                                  <p:childTnLst>
-                                    <p:set>
-                                      <p:cBhvr>
-                                        <p:cTn id="28" dur="1" fill="hold">
-                                          <p:stCondLst>
-                                            <p:cond delay="0"/>
-                                          </p:stCondLst>
-                                        </p:cTn>
-                                        <p:tgtEl>
-                                          <p:spTgt spid="3">
-                                            <p:txEl>
-                                              <p:pRg st="9" end="9"/>
-                                            </p:txEl>
-                                          </p:spTgt>
-                                        </p:tgtEl>
-                                        <p:attrNameLst>
-                                          <p:attrName>style.visibility</p:attrName>
-                                        </p:attrNameLst>
-                                      </p:cBhvr>
-                                      <p:to>
-                                        <p:strVal val="visible"/>
-                                      </p:to>
-                                    </p:set>
-                                  </p:childTnLst>
-                                </p:cTn>
-                              </p:par>
-                            </p:childTnLst>
-                          </p:cTn>
-                        </p:par>
-                      </p:childTnLst>
-                    </p:cTn>
-                  </p:par>
-                </p:childTnLst>
-              </p:cTn>
-              <p:prevCondLst>
-                <p:cond evt="onPrev" delay="0">
-                  <p:tgtEl>
-                    <p:sldTgt/>
-                  </p:tgtEl>
-                </p:cond>
-              </p:prevCondLst>
-              <p:nextCondLst>
-                <p:cond evt="onNext" delay="0">
-                  <p:tgtEl>
-                    <p:sldTgt/>
-                  </p:tgtEl>
-                </p:cond>
-              </p:nextCondLst>
-            </p:seq>
-          </p:childTnLst>
-        </p:cTn>
-      </p:par>
-    </p:tnLst>
-  </p:timing>
-</p:sld>
-</file>
-
-<file path=ppt/slides/slide40.xml><?xml version="1.0" encoding="utf-8"?>
+<file path=ppt/slides/slide41.xml><?xml version="1.0" encoding="utf-8"?>
 <p:sld xmlns:a="http://schemas.openxmlformats.org/drawingml/2006/main" xmlns:r="http://schemas.openxmlformats.org/officeDocument/2006/relationships" xmlns:p="http://schemas.openxmlformats.org/presentationml/2006/main">
   <p:cSld>
     <p:spTree>
@@ -30040,8 +30849,8 @@
           </a:p>
         </p:txBody>
       </p:sp>
-      <mc:AlternateContent xmlns:mc="http://schemas.openxmlformats.org/markup-compatibility/2006">
-        <mc:Choice xmlns:a14="http://schemas.microsoft.com/office/drawing/2010/main" Requires="a14">
+      <mc:AlternateContent xmlns:mc="http://schemas.openxmlformats.org/markup-compatibility/2006" xmlns:a14="http://schemas.microsoft.com/office/drawing/2010/main">
+        <mc:Choice Requires="a14">
           <p:graphicFrame>
             <p:nvGraphicFramePr>
               <p:cNvPr id="2" name="Table 1">
@@ -30540,7 +31349,7 @@
             </a:graphic>
           </p:graphicFrame>
         </mc:Choice>
-        <mc:Fallback>
+        <mc:Fallback xmlns="">
           <p:graphicFrame>
             <p:nvGraphicFramePr>
               <p:cNvPr id="2" name="Table 1">
@@ -30924,7 +31733,7 @@
 </p:sld>
 </file>
 
-<file path=ppt/slides/slide41.xml><?xml version="1.0" encoding="utf-8"?>
+<file path=ppt/slides/slide42.xml><?xml version="1.0" encoding="utf-8"?>
 <p:sld xmlns:a="http://schemas.openxmlformats.org/drawingml/2006/main" xmlns:r="http://schemas.openxmlformats.org/officeDocument/2006/relationships" xmlns:p="http://schemas.openxmlformats.org/presentationml/2006/main">
   <p:cSld>
     <p:spTree>
@@ -30998,7 +31807,7 @@
 </p:sld>
 </file>
 
-<file path=ppt/slides/slide42.xml><?xml version="1.0" encoding="utf-8"?>
+<file path=ppt/slides/slide43.xml><?xml version="1.0" encoding="utf-8"?>
 <p:sld xmlns:a="http://schemas.openxmlformats.org/drawingml/2006/main" xmlns:r="http://schemas.openxmlformats.org/officeDocument/2006/relationships" xmlns:p="http://schemas.openxmlformats.org/presentationml/2006/main">
   <p:cSld>
     <p:spTree>
@@ -31525,7 +32334,7 @@
 </p:sld>
 </file>
 
-<file path=ppt/slides/slide43.xml><?xml version="1.0" encoding="utf-8"?>
+<file path=ppt/slides/slide44.xml><?xml version="1.0" encoding="utf-8"?>
 <p:sld xmlns:a="http://schemas.openxmlformats.org/drawingml/2006/main" xmlns:r="http://schemas.openxmlformats.org/officeDocument/2006/relationships" xmlns:p="http://schemas.openxmlformats.org/presentationml/2006/main">
   <p:cSld>
     <p:spTree>
@@ -31711,7 +32520,7 @@
 </p:sld>
 </file>
 
-<file path=ppt/slides/slide44.xml><?xml version="1.0" encoding="utf-8"?>
+<file path=ppt/slides/slide45.xml><?xml version="1.0" encoding="utf-8"?>
 <p:sld xmlns:a="http://schemas.openxmlformats.org/drawingml/2006/main" xmlns:r="http://schemas.openxmlformats.org/officeDocument/2006/relationships" xmlns:p="http://schemas.openxmlformats.org/presentationml/2006/main">
   <p:cSld>
     <p:spTree>
@@ -31897,7 +32706,7 @@
 </p:sld>
 </file>
 
-<file path=ppt/slides/slide45.xml><?xml version="1.0" encoding="utf-8"?>
+<file path=ppt/slides/slide46.xml><?xml version="1.0" encoding="utf-8"?>
 <p:sld xmlns:a="http://schemas.openxmlformats.org/drawingml/2006/main" xmlns:r="http://schemas.openxmlformats.org/officeDocument/2006/relationships" xmlns:p="http://schemas.openxmlformats.org/presentationml/2006/main">
   <p:cSld>
     <p:spTree>
@@ -31920,8 +32729,8 @@
           <a:chExt cx="0" cy="0"/>
         </a:xfrm>
       </p:grpSpPr>
-      <mc:AlternateContent xmlns:mc="http://schemas.openxmlformats.org/markup-compatibility/2006">
-        <mc:Choice xmlns:a14="http://schemas.microsoft.com/office/drawing/2010/main" Requires="a14">
+      <mc:AlternateContent xmlns:mc="http://schemas.openxmlformats.org/markup-compatibility/2006" xmlns:a14="http://schemas.microsoft.com/office/drawing/2010/main">
+        <mc:Choice Requires="a14">
           <p:sp>
             <p:nvSpPr>
               <p:cNvPr id="3" name="Content Placeholder 2">
@@ -32039,7 +32848,7 @@
             </p:txBody>
           </p:sp>
         </mc:Choice>
-        <mc:Fallback>
+        <mc:Fallback xmlns="">
           <p:sp>
             <p:nvSpPr>
               <p:cNvPr id="3" name="Content Placeholder 2">
@@ -32452,7 +33261,7 @@
 </p:sld>
 </file>
 
-<file path=ppt/slides/slide46.xml><?xml version="1.0" encoding="utf-8"?>
+<file path=ppt/slides/slide47.xml><?xml version="1.0" encoding="utf-8"?>
 <p:sld xmlns:a="http://schemas.openxmlformats.org/drawingml/2006/main" xmlns:r="http://schemas.openxmlformats.org/officeDocument/2006/relationships" xmlns:p="http://schemas.openxmlformats.org/presentationml/2006/main">
   <p:cSld>
     <p:spTree>
@@ -32526,7 +33335,7 @@
 </p:sld>
 </file>
 
-<file path=ppt/slides/slide47.xml><?xml version="1.0" encoding="utf-8"?>
+<file path=ppt/slides/slide48.xml><?xml version="1.0" encoding="utf-8"?>
 <p:sld xmlns:a="http://schemas.openxmlformats.org/drawingml/2006/main" xmlns:r="http://schemas.openxmlformats.org/officeDocument/2006/relationships" xmlns:p="http://schemas.openxmlformats.org/presentationml/2006/main">
   <p:cSld>
     <p:spTree>
@@ -32841,7 +33650,7 @@
 </p:sld>
 </file>
 
-<file path=ppt/slides/slide48.xml><?xml version="1.0" encoding="utf-8"?>
+<file path=ppt/slides/slide49.xml><?xml version="1.0" encoding="utf-8"?>
 <p:sld xmlns:a="http://schemas.openxmlformats.org/drawingml/2006/main" xmlns:r="http://schemas.openxmlformats.org/officeDocument/2006/relationships" xmlns:p="http://schemas.openxmlformats.org/presentationml/2006/main">
   <p:cSld>
     <p:spTree>
@@ -33254,741 +34063,6 @@
         </p:cTn>
       </p:par>
     </p:tnLst>
-  </p:timing>
-</p:sld>
-</file>
-
-<file path=ppt/slides/slide49.xml><?xml version="1.0" encoding="utf-8"?>
-<p:sld xmlns:a="http://schemas.openxmlformats.org/drawingml/2006/main" xmlns:r="http://schemas.openxmlformats.org/officeDocument/2006/relationships" xmlns:p="http://schemas.openxmlformats.org/presentationml/2006/main">
-  <p:cSld>
-    <p:spTree>
-      <p:nvGrpSpPr>
-        <p:cNvPr id="1" name="">
-          <a:extLst>
-            <a:ext uri="{FF2B5EF4-FFF2-40B4-BE49-F238E27FC236}">
-              <a16:creationId xmlns:a16="http://schemas.microsoft.com/office/drawing/2014/main" id="{71C36109-F91B-7FB7-E4E4-71D64B9E9F83}"/>
-            </a:ext>
-          </a:extLst>
-        </p:cNvPr>
-        <p:cNvGrpSpPr/>
-        <p:nvPr/>
-      </p:nvGrpSpPr>
-      <p:grpSpPr>
-        <a:xfrm>
-          <a:off x="0" y="0"/>
-          <a:ext cx="0" cy="0"/>
-          <a:chOff x="0" y="0"/>
-          <a:chExt cx="0" cy="0"/>
-        </a:xfrm>
-      </p:grpSpPr>
-      <p:sp>
-        <p:nvSpPr>
-          <p:cNvPr id="3" name="Content Placeholder 2">
-            <a:extLst>
-              <a:ext uri="{FF2B5EF4-FFF2-40B4-BE49-F238E27FC236}">
-                <a16:creationId xmlns:a16="http://schemas.microsoft.com/office/drawing/2014/main" id="{E4702724-41BB-288F-EEE8-E499F0DBB3A0}"/>
-              </a:ext>
-            </a:extLst>
-          </p:cNvPr>
-          <p:cNvSpPr>
-            <a:spLocks noGrp="1"/>
-          </p:cNvSpPr>
-          <p:nvPr>
-            <p:ph idx="1"/>
-          </p:nvPr>
-        </p:nvSpPr>
-        <p:spPr>
-          <a:xfrm>
-            <a:off x="838200" y="1110713"/>
-            <a:ext cx="10515600" cy="649094"/>
-          </a:xfrm>
-        </p:spPr>
-        <p:txBody>
-          <a:bodyPr>
-            <a:normAutofit/>
-          </a:bodyPr>
-          <a:lstStyle/>
-          <a:p>
-            <a:pPr marL="0" indent="0">
-              <a:buNone/>
-            </a:pPr>
-            <a:r>
-              <a:rPr lang="en-US" dirty="0"/>
-              <a:t>How can we do similarity search on images?</a:t>
-            </a:r>
-          </a:p>
-          <a:p>
-            <a:endParaRPr lang="en-US" dirty="0"/>
-          </a:p>
-          <a:p>
-            <a:pPr marL="0" indent="0">
-              <a:buNone/>
-            </a:pPr>
-            <a:endParaRPr lang="en-US" dirty="0"/>
-          </a:p>
-        </p:txBody>
-      </p:sp>
-      <p:sp>
-        <p:nvSpPr>
-          <p:cNvPr id="4" name="Title 1">
-            <a:extLst>
-              <a:ext uri="{FF2B5EF4-FFF2-40B4-BE49-F238E27FC236}">
-                <a16:creationId xmlns:a16="http://schemas.microsoft.com/office/drawing/2014/main" id="{F6CBE795-70B7-0380-F7B4-5D5C9F6941F1}"/>
-              </a:ext>
-            </a:extLst>
-          </p:cNvPr>
-          <p:cNvSpPr>
-            <a:spLocks noGrp="1"/>
-          </p:cNvSpPr>
-          <p:nvPr>
-            <p:ph type="title"/>
-          </p:nvPr>
-        </p:nvSpPr>
-        <p:spPr>
-          <a:xfrm>
-            <a:off x="744894" y="290480"/>
-            <a:ext cx="10515600" cy="628585"/>
-          </a:xfrm>
-        </p:spPr>
-        <p:txBody>
-          <a:bodyPr>
-            <a:normAutofit fontScale="90000"/>
-          </a:bodyPr>
-          <a:lstStyle/>
-          <a:p>
-            <a:r>
-              <a:rPr lang="en-US" dirty="0">
-                <a:latin typeface="+mn-lt"/>
-              </a:rPr>
-              <a:t>Image embeddings</a:t>
-            </a:r>
-          </a:p>
-        </p:txBody>
-      </p:sp>
-      <p:sp>
-        <p:nvSpPr>
-          <p:cNvPr id="6" name="AutoShape 4">
-            <a:extLst>
-              <a:ext uri="{FF2B5EF4-FFF2-40B4-BE49-F238E27FC236}">
-                <a16:creationId xmlns:a16="http://schemas.microsoft.com/office/drawing/2014/main" id="{40F71A58-6117-2A73-B7C3-5366217111A5}"/>
-              </a:ext>
-            </a:extLst>
-          </p:cNvPr>
-          <p:cNvSpPr>
-            <a:spLocks noChangeAspect="1" noChangeArrowheads="1"/>
-          </p:cNvSpPr>
-          <p:nvPr/>
-        </p:nvSpPr>
-        <p:spPr bwMode="auto">
-          <a:xfrm>
-            <a:off x="5943600" y="3276600"/>
-            <a:ext cx="304800" cy="304800"/>
-          </a:xfrm>
-          <a:prstGeom prst="rect">
-            <a:avLst/>
-          </a:prstGeom>
-          <a:noFill/>
-          <a:extLst>
-            <a:ext uri="{909E8E84-426E-40DD-AFC4-6F175D3DCCD1}">
-              <a14:hiddenFill xmlns:a14="http://schemas.microsoft.com/office/drawing/2010/main">
-                <a:solidFill>
-                  <a:srgbClr val="FFFFFF"/>
-                </a:solidFill>
-              </a14:hiddenFill>
-            </a:ext>
-          </a:extLst>
-        </p:spPr>
-        <p:txBody>
-          <a:bodyPr vert="horz" wrap="square" lIns="91440" tIns="45720" rIns="91440" bIns="45720" numCol="1" anchor="t" anchorCtr="0" compatLnSpc="1">
-            <a:prstTxWarp prst="textNoShape">
-              <a:avLst/>
-            </a:prstTxWarp>
-          </a:bodyPr>
-          <a:lstStyle/>
-          <a:p>
-            <a:endParaRPr lang="en-US"/>
-          </a:p>
-        </p:txBody>
-      </p:sp>
-      <p:pic>
-        <p:nvPicPr>
-          <p:cNvPr id="5" name="Picture 4">
-            <a:extLst>
-              <a:ext uri="{FF2B5EF4-FFF2-40B4-BE49-F238E27FC236}">
-                <a16:creationId xmlns:a16="http://schemas.microsoft.com/office/drawing/2014/main" id="{F6DA3E48-3684-3B3C-48AC-FFA5FA26D914}"/>
-              </a:ext>
-            </a:extLst>
-          </p:cNvPr>
-          <p:cNvPicPr>
-            <a:picLocks noChangeAspect="1"/>
-          </p:cNvPicPr>
-          <p:nvPr/>
-        </p:nvPicPr>
-        <p:blipFill>
-          <a:blip r:embed="rId2"/>
-          <a:stretch>
-            <a:fillRect/>
-          </a:stretch>
-        </p:blipFill>
-        <p:spPr>
-          <a:xfrm>
-            <a:off x="628867" y="2133145"/>
-            <a:ext cx="5619533" cy="4043322"/>
-          </a:xfrm>
-          <a:prstGeom prst="rect">
-            <a:avLst/>
-          </a:prstGeom>
-        </p:spPr>
-      </p:pic>
-      <p:sp>
-        <p:nvSpPr>
-          <p:cNvPr id="7" name="TextBox 6">
-            <a:extLst>
-              <a:ext uri="{FF2B5EF4-FFF2-40B4-BE49-F238E27FC236}">
-                <a16:creationId xmlns:a16="http://schemas.microsoft.com/office/drawing/2014/main" id="{4E9AAA6C-6F2D-137D-FA96-098A202CEAB3}"/>
-              </a:ext>
-            </a:extLst>
-          </p:cNvPr>
-          <p:cNvSpPr txBox="1"/>
-          <p:nvPr/>
-        </p:nvSpPr>
-        <p:spPr>
-          <a:xfrm>
-            <a:off x="7410896" y="1981604"/>
-            <a:ext cx="3491865" cy="830997"/>
-          </a:xfrm>
-          <a:prstGeom prst="rect">
-            <a:avLst/>
-          </a:prstGeom>
-          <a:noFill/>
-        </p:spPr>
-        <p:txBody>
-          <a:bodyPr wrap="square" rtlCol="0">
-            <a:spAutoFit/>
-          </a:bodyPr>
-          <a:lstStyle/>
-          <a:p>
-            <a:pPr marL="457200" indent="-457200">
-              <a:buFont typeface="+mj-lt"/>
-              <a:buAutoNum type="arabicPeriod"/>
-            </a:pPr>
-            <a:r>
-              <a:rPr lang="en-US" sz="2400" dirty="0"/>
-              <a:t>Embedded text queries</a:t>
-            </a:r>
-          </a:p>
-        </p:txBody>
-      </p:sp>
-      <p:cxnSp>
-        <p:nvCxnSpPr>
-          <p:cNvPr id="9" name="Straight Arrow Connector 8">
-            <a:extLst>
-              <a:ext uri="{FF2B5EF4-FFF2-40B4-BE49-F238E27FC236}">
-                <a16:creationId xmlns:a16="http://schemas.microsoft.com/office/drawing/2014/main" id="{1CC0FDE5-B679-43E1-D012-A40E2DD5713B}"/>
-              </a:ext>
-            </a:extLst>
-          </p:cNvPr>
-          <p:cNvCxnSpPr>
-            <a:cxnSpLocks/>
-            <a:stCxn id="7" idx="1"/>
-          </p:cNvCxnSpPr>
-          <p:nvPr/>
-        </p:nvCxnSpPr>
-        <p:spPr>
-          <a:xfrm flipH="1">
-            <a:off x="5505855" y="2397103"/>
-            <a:ext cx="1905041" cy="1926766"/>
-          </a:xfrm>
-          <a:prstGeom prst="straightConnector1">
-            <a:avLst/>
-          </a:prstGeom>
-          <a:ln w="31750">
-            <a:solidFill>
-              <a:schemeClr val="tx1"/>
-            </a:solidFill>
-            <a:tailEnd type="triangle"/>
-          </a:ln>
-        </p:spPr>
-        <p:style>
-          <a:lnRef idx="1">
-            <a:schemeClr val="accent1"/>
-          </a:lnRef>
-          <a:fillRef idx="0">
-            <a:schemeClr val="accent1"/>
-          </a:fillRef>
-          <a:effectRef idx="0">
-            <a:schemeClr val="accent1"/>
-          </a:effectRef>
-          <a:fontRef idx="minor">
-            <a:schemeClr val="tx1"/>
-          </a:fontRef>
-        </p:style>
-      </p:cxnSp>
-      <p:sp>
-        <p:nvSpPr>
-          <p:cNvPr id="10" name="TextBox 9">
-            <a:extLst>
-              <a:ext uri="{FF2B5EF4-FFF2-40B4-BE49-F238E27FC236}">
-                <a16:creationId xmlns:a16="http://schemas.microsoft.com/office/drawing/2014/main" id="{0AC8703C-624D-4210-1032-1A0C44179158}"/>
-              </a:ext>
-            </a:extLst>
-          </p:cNvPr>
-          <p:cNvSpPr txBox="1"/>
-          <p:nvPr/>
-        </p:nvSpPr>
-        <p:spPr>
-          <a:xfrm>
-            <a:off x="7304783" y="5464148"/>
-            <a:ext cx="4699149" cy="1200329"/>
-          </a:xfrm>
-          <a:prstGeom prst="rect">
-            <a:avLst/>
-          </a:prstGeom>
-          <a:noFill/>
-        </p:spPr>
-        <p:txBody>
-          <a:bodyPr wrap="square" rtlCol="0">
-            <a:spAutoFit/>
-          </a:bodyPr>
-          <a:lstStyle/>
-          <a:p>
-            <a:pPr marL="457200" indent="-457200">
-              <a:buFont typeface="+mj-lt"/>
-              <a:buAutoNum type="arabicPeriod" startAt="3"/>
-            </a:pPr>
-            <a:r>
-              <a:rPr lang="en-US" sz="2400" dirty="0"/>
-              <a:t>Similarity scores computed between text and image embeddings</a:t>
-            </a:r>
-          </a:p>
-        </p:txBody>
-      </p:sp>
-      <p:cxnSp>
-        <p:nvCxnSpPr>
-          <p:cNvPr id="11" name="Straight Arrow Connector 10">
-            <a:extLst>
-              <a:ext uri="{FF2B5EF4-FFF2-40B4-BE49-F238E27FC236}">
-                <a16:creationId xmlns:a16="http://schemas.microsoft.com/office/drawing/2014/main" id="{469A32BD-66C2-3E5C-7EAD-3290D33E40AF}"/>
-              </a:ext>
-            </a:extLst>
-          </p:cNvPr>
-          <p:cNvCxnSpPr>
-            <a:cxnSpLocks/>
-            <a:stCxn id="10" idx="1"/>
-          </p:cNvCxnSpPr>
-          <p:nvPr/>
-        </p:nvCxnSpPr>
-        <p:spPr>
-          <a:xfrm flipH="1" flipV="1">
-            <a:off x="5869021" y="5747288"/>
-            <a:ext cx="1435762" cy="317025"/>
-          </a:xfrm>
-          <a:prstGeom prst="straightConnector1">
-            <a:avLst/>
-          </a:prstGeom>
-          <a:ln w="31750">
-            <a:solidFill>
-              <a:schemeClr val="tx1"/>
-            </a:solidFill>
-            <a:tailEnd type="triangle"/>
-          </a:ln>
-        </p:spPr>
-        <p:style>
-          <a:lnRef idx="1">
-            <a:schemeClr val="accent1"/>
-          </a:lnRef>
-          <a:fillRef idx="0">
-            <a:schemeClr val="accent1"/>
-          </a:fillRef>
-          <a:effectRef idx="0">
-            <a:schemeClr val="accent1"/>
-          </a:effectRef>
-          <a:fontRef idx="minor">
-            <a:schemeClr val="tx1"/>
-          </a:fontRef>
-        </p:style>
-      </p:cxnSp>
-      <p:sp>
-        <p:nvSpPr>
-          <p:cNvPr id="18" name="TextBox 17">
-            <a:extLst>
-              <a:ext uri="{FF2B5EF4-FFF2-40B4-BE49-F238E27FC236}">
-                <a16:creationId xmlns:a16="http://schemas.microsoft.com/office/drawing/2014/main" id="{BC3930AC-8A44-302E-E15D-05A3B86DFFD5}"/>
-              </a:ext>
-            </a:extLst>
-          </p:cNvPr>
-          <p:cNvSpPr txBox="1"/>
-          <p:nvPr/>
-        </p:nvSpPr>
-        <p:spPr>
-          <a:xfrm>
-            <a:off x="7553567" y="3818734"/>
-            <a:ext cx="3491865" cy="830997"/>
-          </a:xfrm>
-          <a:prstGeom prst="rect">
-            <a:avLst/>
-          </a:prstGeom>
-          <a:noFill/>
-        </p:spPr>
-        <p:txBody>
-          <a:bodyPr wrap="square" rtlCol="0">
-            <a:spAutoFit/>
-          </a:bodyPr>
-          <a:lstStyle/>
-          <a:p>
-            <a:pPr marL="457200" indent="-457200">
-              <a:buFont typeface="+mj-lt"/>
-              <a:buAutoNum type="arabicPeriod" startAt="2"/>
-            </a:pPr>
-            <a:r>
-              <a:rPr lang="en-US" sz="2400" dirty="0"/>
-              <a:t>Embedded images from database</a:t>
-            </a:r>
-          </a:p>
-        </p:txBody>
-      </p:sp>
-      <p:cxnSp>
-        <p:nvCxnSpPr>
-          <p:cNvPr id="19" name="Straight Arrow Connector 18">
-            <a:extLst>
-              <a:ext uri="{FF2B5EF4-FFF2-40B4-BE49-F238E27FC236}">
-                <a16:creationId xmlns:a16="http://schemas.microsoft.com/office/drawing/2014/main" id="{C172ED3F-1A19-96D0-970F-E4646497EF28}"/>
-              </a:ext>
-            </a:extLst>
-          </p:cNvPr>
-          <p:cNvCxnSpPr>
-            <a:cxnSpLocks/>
-          </p:cNvCxnSpPr>
-          <p:nvPr/>
-        </p:nvCxnSpPr>
-        <p:spPr>
-          <a:xfrm flipH="1">
-            <a:off x="6310009" y="4410211"/>
-            <a:ext cx="1310220" cy="680598"/>
-          </a:xfrm>
-          <a:prstGeom prst="straightConnector1">
-            <a:avLst/>
-          </a:prstGeom>
-          <a:ln w="31750">
-            <a:solidFill>
-              <a:schemeClr val="tx1"/>
-            </a:solidFill>
-            <a:tailEnd type="triangle"/>
-          </a:ln>
-        </p:spPr>
-        <p:style>
-          <a:lnRef idx="1">
-            <a:schemeClr val="accent1"/>
-          </a:lnRef>
-          <a:fillRef idx="0">
-            <a:schemeClr val="accent1"/>
-          </a:fillRef>
-          <a:effectRef idx="0">
-            <a:schemeClr val="accent1"/>
-          </a:effectRef>
-          <a:fontRef idx="minor">
-            <a:schemeClr val="tx1"/>
-          </a:fontRef>
-        </p:style>
-      </p:cxnSp>
-      <p:sp>
-        <p:nvSpPr>
-          <p:cNvPr id="24" name="TextBox 23">
-            <a:extLst>
-              <a:ext uri="{FF2B5EF4-FFF2-40B4-BE49-F238E27FC236}">
-                <a16:creationId xmlns:a16="http://schemas.microsoft.com/office/drawing/2014/main" id="{93878FCF-CEC5-4918-988C-3CB7672E10F7}"/>
-              </a:ext>
-            </a:extLst>
-          </p:cNvPr>
-          <p:cNvSpPr txBox="1"/>
-          <p:nvPr/>
-        </p:nvSpPr>
-        <p:spPr>
-          <a:xfrm>
-            <a:off x="1874196" y="6290553"/>
-            <a:ext cx="3547353" cy="369332"/>
-          </a:xfrm>
-          <a:prstGeom prst="rect">
-            <a:avLst/>
-          </a:prstGeom>
-          <a:noFill/>
-        </p:spPr>
-        <p:txBody>
-          <a:bodyPr wrap="square" rtlCol="0">
-            <a:spAutoFit/>
-          </a:bodyPr>
-          <a:lstStyle/>
-          <a:p>
-            <a:r>
-              <a:rPr lang="en-US" dirty="0">
-                <a:hlinkClick r:id="rId3"/>
-              </a:rPr>
-              <a:t>Drawing from Radford, et. al., 2021</a:t>
-            </a:r>
-            <a:endParaRPr lang="en-US" dirty="0"/>
-          </a:p>
-        </p:txBody>
-      </p:sp>
-    </p:spTree>
-    <p:extLst>
-      <p:ext uri="{BB962C8B-B14F-4D97-AF65-F5344CB8AC3E}">
-        <p14:creationId xmlns:p14="http://schemas.microsoft.com/office/powerpoint/2010/main" val="2642663674"/>
-      </p:ext>
-    </p:extLst>
-  </p:cSld>
-  <p:clrMapOvr>
-    <a:masterClrMapping/>
-  </p:clrMapOvr>
-  <p:timing>
-    <p:tnLst>
-      <p:par>
-        <p:cTn id="1" dur="indefinite" restart="never" nodeType="tmRoot">
-          <p:childTnLst>
-            <p:seq concurrent="1" nextAc="seek">
-              <p:cTn id="2" dur="indefinite" nodeType="mainSeq">
-                <p:childTnLst>
-                  <p:par>
-                    <p:cTn id="3" fill="hold">
-                      <p:stCondLst>
-                        <p:cond delay="indefinite"/>
-                      </p:stCondLst>
-                      <p:childTnLst>
-                        <p:par>
-                          <p:cTn id="4" fill="hold">
-                            <p:stCondLst>
-                              <p:cond delay="0"/>
-                            </p:stCondLst>
-                            <p:childTnLst>
-                              <p:par>
-                                <p:cTn id="5" presetID="1" presetClass="entr" presetSubtype="0" fill="hold" nodeType="clickEffect">
-                                  <p:stCondLst>
-                                    <p:cond delay="0"/>
-                                  </p:stCondLst>
-                                  <p:childTnLst>
-                                    <p:set>
-                                      <p:cBhvr>
-                                        <p:cTn id="6" dur="1" fill="hold">
-                                          <p:stCondLst>
-                                            <p:cond delay="0"/>
-                                          </p:stCondLst>
-                                        </p:cTn>
-                                        <p:tgtEl>
-                                          <p:spTgt spid="9"/>
-                                        </p:tgtEl>
-                                        <p:attrNameLst>
-                                          <p:attrName>style.visibility</p:attrName>
-                                        </p:attrNameLst>
-                                      </p:cBhvr>
-                                      <p:to>
-                                        <p:strVal val="visible"/>
-                                      </p:to>
-                                    </p:set>
-                                  </p:childTnLst>
-                                </p:cTn>
-                              </p:par>
-                              <p:par>
-                                <p:cTn id="7" presetID="1" presetClass="entr" presetSubtype="0" fill="hold" grpId="0" nodeType="withEffect">
-                                  <p:stCondLst>
-                                    <p:cond delay="0"/>
-                                  </p:stCondLst>
-                                  <p:childTnLst>
-                                    <p:set>
-                                      <p:cBhvr>
-                                        <p:cTn id="8" dur="1" fill="hold">
-                                          <p:stCondLst>
-                                            <p:cond delay="0"/>
-                                          </p:stCondLst>
-                                        </p:cTn>
-                                        <p:tgtEl>
-                                          <p:spTgt spid="7"/>
-                                        </p:tgtEl>
-                                        <p:attrNameLst>
-                                          <p:attrName>style.visibility</p:attrName>
-                                        </p:attrNameLst>
-                                      </p:cBhvr>
-                                      <p:to>
-                                        <p:strVal val="visible"/>
-                                      </p:to>
-                                    </p:set>
-                                  </p:childTnLst>
-                                </p:cTn>
-                              </p:par>
-                            </p:childTnLst>
-                          </p:cTn>
-                        </p:par>
-                      </p:childTnLst>
-                    </p:cTn>
-                  </p:par>
-                  <p:par>
-                    <p:cTn id="9" fill="hold">
-                      <p:stCondLst>
-                        <p:cond delay="indefinite"/>
-                      </p:stCondLst>
-                      <p:childTnLst>
-                        <p:par>
-                          <p:cTn id="10" fill="hold">
-                            <p:stCondLst>
-                              <p:cond delay="0"/>
-                            </p:stCondLst>
-                            <p:childTnLst>
-                              <p:par>
-                                <p:cTn id="11" presetID="1" presetClass="entr" presetSubtype="0" fill="hold" grpId="0" nodeType="clickEffect">
-                                  <p:stCondLst>
-                                    <p:cond delay="0"/>
-                                  </p:stCondLst>
-                                  <p:childTnLst>
-                                    <p:set>
-                                      <p:cBhvr>
-                                        <p:cTn id="12" dur="1" fill="hold">
-                                          <p:stCondLst>
-                                            <p:cond delay="0"/>
-                                          </p:stCondLst>
-                                        </p:cTn>
-                                        <p:tgtEl>
-                                          <p:spTgt spid="18"/>
-                                        </p:tgtEl>
-                                        <p:attrNameLst>
-                                          <p:attrName>style.visibility</p:attrName>
-                                        </p:attrNameLst>
-                                      </p:cBhvr>
-                                      <p:to>
-                                        <p:strVal val="visible"/>
-                                      </p:to>
-                                    </p:set>
-                                  </p:childTnLst>
-                                </p:cTn>
-                              </p:par>
-                              <p:par>
-                                <p:cTn id="13" presetID="1" presetClass="entr" presetSubtype="0" fill="hold" nodeType="withEffect">
-                                  <p:stCondLst>
-                                    <p:cond delay="0"/>
-                                  </p:stCondLst>
-                                  <p:childTnLst>
-                                    <p:set>
-                                      <p:cBhvr>
-                                        <p:cTn id="14" dur="1" fill="hold">
-                                          <p:stCondLst>
-                                            <p:cond delay="0"/>
-                                          </p:stCondLst>
-                                        </p:cTn>
-                                        <p:tgtEl>
-                                          <p:spTgt spid="19"/>
-                                        </p:tgtEl>
-                                        <p:attrNameLst>
-                                          <p:attrName>style.visibility</p:attrName>
-                                        </p:attrNameLst>
-                                      </p:cBhvr>
-                                      <p:to>
-                                        <p:strVal val="visible"/>
-                                      </p:to>
-                                    </p:set>
-                                  </p:childTnLst>
-                                </p:cTn>
-                              </p:par>
-                            </p:childTnLst>
-                          </p:cTn>
-                        </p:par>
-                      </p:childTnLst>
-                    </p:cTn>
-                  </p:par>
-                  <p:par>
-                    <p:cTn id="15" fill="hold">
-                      <p:stCondLst>
-                        <p:cond delay="indefinite"/>
-                      </p:stCondLst>
-                      <p:childTnLst>
-                        <p:par>
-                          <p:cTn id="16" fill="hold">
-                            <p:stCondLst>
-                              <p:cond delay="0"/>
-                            </p:stCondLst>
-                            <p:childTnLst>
-                              <p:par>
-                                <p:cTn id="17" presetID="1" presetClass="entr" presetSubtype="0" fill="hold" grpId="0" nodeType="clickEffect">
-                                  <p:stCondLst>
-                                    <p:cond delay="0"/>
-                                  </p:stCondLst>
-                                  <p:childTnLst>
-                                    <p:set>
-                                      <p:cBhvr>
-                                        <p:cTn id="18" dur="1" fill="hold">
-                                          <p:stCondLst>
-                                            <p:cond delay="0"/>
-                                          </p:stCondLst>
-                                        </p:cTn>
-                                        <p:tgtEl>
-                                          <p:spTgt spid="10"/>
-                                        </p:tgtEl>
-                                        <p:attrNameLst>
-                                          <p:attrName>style.visibility</p:attrName>
-                                        </p:attrNameLst>
-                                      </p:cBhvr>
-                                      <p:to>
-                                        <p:strVal val="visible"/>
-                                      </p:to>
-                                    </p:set>
-                                  </p:childTnLst>
-                                </p:cTn>
-                              </p:par>
-                              <p:par>
-                                <p:cTn id="19" presetID="1" presetClass="entr" presetSubtype="0" fill="hold" nodeType="withEffect">
-                                  <p:stCondLst>
-                                    <p:cond delay="0"/>
-                                  </p:stCondLst>
-                                  <p:childTnLst>
-                                    <p:set>
-                                      <p:cBhvr>
-                                        <p:cTn id="20" dur="1" fill="hold">
-                                          <p:stCondLst>
-                                            <p:cond delay="0"/>
-                                          </p:stCondLst>
-                                        </p:cTn>
-                                        <p:tgtEl>
-                                          <p:spTgt spid="11"/>
-                                        </p:tgtEl>
-                                        <p:attrNameLst>
-                                          <p:attrName>style.visibility</p:attrName>
-                                        </p:attrNameLst>
-                                      </p:cBhvr>
-                                      <p:to>
-                                        <p:strVal val="visible"/>
-                                      </p:to>
-                                    </p:set>
-                                  </p:childTnLst>
-                                </p:cTn>
-                              </p:par>
-                            </p:childTnLst>
-                          </p:cTn>
-                        </p:par>
-                      </p:childTnLst>
-                    </p:cTn>
-                  </p:par>
-                </p:childTnLst>
-              </p:cTn>
-              <p:prevCondLst>
-                <p:cond evt="onPrev" delay="0">
-                  <p:tgtEl>
-                    <p:sldTgt/>
-                  </p:tgtEl>
-                </p:cond>
-              </p:prevCondLst>
-              <p:nextCondLst>
-                <p:cond evt="onNext" delay="0">
-                  <p:tgtEl>
-                    <p:sldTgt/>
-                  </p:tgtEl>
-                </p:cond>
-              </p:nextCondLst>
-            </p:seq>
-          </p:childTnLst>
-        </p:cTn>
-      </p:par>
-    </p:tnLst>
-    <p:bldLst>
-      <p:bldP spid="7" grpId="0"/>
-      <p:bldP spid="10" grpId="0"/>
-      <p:bldP spid="18" grpId="0"/>
-    </p:bldLst>
   </p:timing>
 </p:sld>
 </file>
@@ -34548,6 +34622,741 @@
         <p:cNvPr id="1" name="">
           <a:extLst>
             <a:ext uri="{FF2B5EF4-FFF2-40B4-BE49-F238E27FC236}">
+              <a16:creationId xmlns:a16="http://schemas.microsoft.com/office/drawing/2014/main" id="{71C36109-F91B-7FB7-E4E4-71D64B9E9F83}"/>
+            </a:ext>
+          </a:extLst>
+        </p:cNvPr>
+        <p:cNvGrpSpPr/>
+        <p:nvPr/>
+      </p:nvGrpSpPr>
+      <p:grpSpPr>
+        <a:xfrm>
+          <a:off x="0" y="0"/>
+          <a:ext cx="0" cy="0"/>
+          <a:chOff x="0" y="0"/>
+          <a:chExt cx="0" cy="0"/>
+        </a:xfrm>
+      </p:grpSpPr>
+      <p:sp>
+        <p:nvSpPr>
+          <p:cNvPr id="3" name="Content Placeholder 2">
+            <a:extLst>
+              <a:ext uri="{FF2B5EF4-FFF2-40B4-BE49-F238E27FC236}">
+                <a16:creationId xmlns:a16="http://schemas.microsoft.com/office/drawing/2014/main" id="{E4702724-41BB-288F-EEE8-E499F0DBB3A0}"/>
+              </a:ext>
+            </a:extLst>
+          </p:cNvPr>
+          <p:cNvSpPr>
+            <a:spLocks noGrp="1"/>
+          </p:cNvSpPr>
+          <p:nvPr>
+            <p:ph idx="1"/>
+          </p:nvPr>
+        </p:nvSpPr>
+        <p:spPr>
+          <a:xfrm>
+            <a:off x="838200" y="1110713"/>
+            <a:ext cx="10515600" cy="649094"/>
+          </a:xfrm>
+        </p:spPr>
+        <p:txBody>
+          <a:bodyPr>
+            <a:normAutofit/>
+          </a:bodyPr>
+          <a:lstStyle/>
+          <a:p>
+            <a:pPr marL="0" indent="0">
+              <a:buNone/>
+            </a:pPr>
+            <a:r>
+              <a:rPr lang="en-US" dirty="0"/>
+              <a:t>How can we do similarity search on images?</a:t>
+            </a:r>
+          </a:p>
+          <a:p>
+            <a:endParaRPr lang="en-US" dirty="0"/>
+          </a:p>
+          <a:p>
+            <a:pPr marL="0" indent="0">
+              <a:buNone/>
+            </a:pPr>
+            <a:endParaRPr lang="en-US" dirty="0"/>
+          </a:p>
+        </p:txBody>
+      </p:sp>
+      <p:sp>
+        <p:nvSpPr>
+          <p:cNvPr id="4" name="Title 1">
+            <a:extLst>
+              <a:ext uri="{FF2B5EF4-FFF2-40B4-BE49-F238E27FC236}">
+                <a16:creationId xmlns:a16="http://schemas.microsoft.com/office/drawing/2014/main" id="{F6CBE795-70B7-0380-F7B4-5D5C9F6941F1}"/>
+              </a:ext>
+            </a:extLst>
+          </p:cNvPr>
+          <p:cNvSpPr>
+            <a:spLocks noGrp="1"/>
+          </p:cNvSpPr>
+          <p:nvPr>
+            <p:ph type="title"/>
+          </p:nvPr>
+        </p:nvSpPr>
+        <p:spPr>
+          <a:xfrm>
+            <a:off x="744894" y="290480"/>
+            <a:ext cx="10515600" cy="628585"/>
+          </a:xfrm>
+        </p:spPr>
+        <p:txBody>
+          <a:bodyPr>
+            <a:normAutofit fontScale="90000"/>
+          </a:bodyPr>
+          <a:lstStyle/>
+          <a:p>
+            <a:r>
+              <a:rPr lang="en-US" dirty="0">
+                <a:latin typeface="+mn-lt"/>
+              </a:rPr>
+              <a:t>Image embeddings</a:t>
+            </a:r>
+          </a:p>
+        </p:txBody>
+      </p:sp>
+      <p:sp>
+        <p:nvSpPr>
+          <p:cNvPr id="6" name="AutoShape 4">
+            <a:extLst>
+              <a:ext uri="{FF2B5EF4-FFF2-40B4-BE49-F238E27FC236}">
+                <a16:creationId xmlns:a16="http://schemas.microsoft.com/office/drawing/2014/main" id="{40F71A58-6117-2A73-B7C3-5366217111A5}"/>
+              </a:ext>
+            </a:extLst>
+          </p:cNvPr>
+          <p:cNvSpPr>
+            <a:spLocks noChangeAspect="1" noChangeArrowheads="1"/>
+          </p:cNvSpPr>
+          <p:nvPr/>
+        </p:nvSpPr>
+        <p:spPr bwMode="auto">
+          <a:xfrm>
+            <a:off x="5943600" y="3276600"/>
+            <a:ext cx="304800" cy="304800"/>
+          </a:xfrm>
+          <a:prstGeom prst="rect">
+            <a:avLst/>
+          </a:prstGeom>
+          <a:noFill/>
+          <a:extLst>
+            <a:ext uri="{909E8E84-426E-40DD-AFC4-6F175D3DCCD1}">
+              <a14:hiddenFill xmlns:a14="http://schemas.microsoft.com/office/drawing/2010/main">
+                <a:solidFill>
+                  <a:srgbClr val="FFFFFF"/>
+                </a:solidFill>
+              </a14:hiddenFill>
+            </a:ext>
+          </a:extLst>
+        </p:spPr>
+        <p:txBody>
+          <a:bodyPr vert="horz" wrap="square" lIns="91440" tIns="45720" rIns="91440" bIns="45720" numCol="1" anchor="t" anchorCtr="0" compatLnSpc="1">
+            <a:prstTxWarp prst="textNoShape">
+              <a:avLst/>
+            </a:prstTxWarp>
+          </a:bodyPr>
+          <a:lstStyle/>
+          <a:p>
+            <a:endParaRPr lang="en-US"/>
+          </a:p>
+        </p:txBody>
+      </p:sp>
+      <p:pic>
+        <p:nvPicPr>
+          <p:cNvPr id="5" name="Picture 4">
+            <a:extLst>
+              <a:ext uri="{FF2B5EF4-FFF2-40B4-BE49-F238E27FC236}">
+                <a16:creationId xmlns:a16="http://schemas.microsoft.com/office/drawing/2014/main" id="{F6DA3E48-3684-3B3C-48AC-FFA5FA26D914}"/>
+              </a:ext>
+            </a:extLst>
+          </p:cNvPr>
+          <p:cNvPicPr>
+            <a:picLocks noChangeAspect="1"/>
+          </p:cNvPicPr>
+          <p:nvPr/>
+        </p:nvPicPr>
+        <p:blipFill>
+          <a:blip r:embed="rId2"/>
+          <a:stretch>
+            <a:fillRect/>
+          </a:stretch>
+        </p:blipFill>
+        <p:spPr>
+          <a:xfrm>
+            <a:off x="628867" y="2133145"/>
+            <a:ext cx="5619533" cy="4043322"/>
+          </a:xfrm>
+          <a:prstGeom prst="rect">
+            <a:avLst/>
+          </a:prstGeom>
+        </p:spPr>
+      </p:pic>
+      <p:sp>
+        <p:nvSpPr>
+          <p:cNvPr id="7" name="TextBox 6">
+            <a:extLst>
+              <a:ext uri="{FF2B5EF4-FFF2-40B4-BE49-F238E27FC236}">
+                <a16:creationId xmlns:a16="http://schemas.microsoft.com/office/drawing/2014/main" id="{4E9AAA6C-6F2D-137D-FA96-098A202CEAB3}"/>
+              </a:ext>
+            </a:extLst>
+          </p:cNvPr>
+          <p:cNvSpPr txBox="1"/>
+          <p:nvPr/>
+        </p:nvSpPr>
+        <p:spPr>
+          <a:xfrm>
+            <a:off x="7410896" y="1981604"/>
+            <a:ext cx="3491865" cy="830997"/>
+          </a:xfrm>
+          <a:prstGeom prst="rect">
+            <a:avLst/>
+          </a:prstGeom>
+          <a:noFill/>
+        </p:spPr>
+        <p:txBody>
+          <a:bodyPr wrap="square" rtlCol="0">
+            <a:spAutoFit/>
+          </a:bodyPr>
+          <a:lstStyle/>
+          <a:p>
+            <a:pPr marL="457200" indent="-457200">
+              <a:buFont typeface="+mj-lt"/>
+              <a:buAutoNum type="arabicPeriod"/>
+            </a:pPr>
+            <a:r>
+              <a:rPr lang="en-US" sz="2400" dirty="0"/>
+              <a:t>Embedded text queries</a:t>
+            </a:r>
+          </a:p>
+        </p:txBody>
+      </p:sp>
+      <p:cxnSp>
+        <p:nvCxnSpPr>
+          <p:cNvPr id="9" name="Straight Arrow Connector 8">
+            <a:extLst>
+              <a:ext uri="{FF2B5EF4-FFF2-40B4-BE49-F238E27FC236}">
+                <a16:creationId xmlns:a16="http://schemas.microsoft.com/office/drawing/2014/main" id="{1CC0FDE5-B679-43E1-D012-A40E2DD5713B}"/>
+              </a:ext>
+            </a:extLst>
+          </p:cNvPr>
+          <p:cNvCxnSpPr>
+            <a:cxnSpLocks/>
+            <a:stCxn id="7" idx="1"/>
+          </p:cNvCxnSpPr>
+          <p:nvPr/>
+        </p:nvCxnSpPr>
+        <p:spPr>
+          <a:xfrm flipH="1">
+            <a:off x="5505855" y="2397103"/>
+            <a:ext cx="1905041" cy="1926766"/>
+          </a:xfrm>
+          <a:prstGeom prst="straightConnector1">
+            <a:avLst/>
+          </a:prstGeom>
+          <a:ln w="31750">
+            <a:solidFill>
+              <a:schemeClr val="tx1"/>
+            </a:solidFill>
+            <a:tailEnd type="triangle"/>
+          </a:ln>
+        </p:spPr>
+        <p:style>
+          <a:lnRef idx="1">
+            <a:schemeClr val="accent1"/>
+          </a:lnRef>
+          <a:fillRef idx="0">
+            <a:schemeClr val="accent1"/>
+          </a:fillRef>
+          <a:effectRef idx="0">
+            <a:schemeClr val="accent1"/>
+          </a:effectRef>
+          <a:fontRef idx="minor">
+            <a:schemeClr val="tx1"/>
+          </a:fontRef>
+        </p:style>
+      </p:cxnSp>
+      <p:sp>
+        <p:nvSpPr>
+          <p:cNvPr id="10" name="TextBox 9">
+            <a:extLst>
+              <a:ext uri="{FF2B5EF4-FFF2-40B4-BE49-F238E27FC236}">
+                <a16:creationId xmlns:a16="http://schemas.microsoft.com/office/drawing/2014/main" id="{0AC8703C-624D-4210-1032-1A0C44179158}"/>
+              </a:ext>
+            </a:extLst>
+          </p:cNvPr>
+          <p:cNvSpPr txBox="1"/>
+          <p:nvPr/>
+        </p:nvSpPr>
+        <p:spPr>
+          <a:xfrm>
+            <a:off x="7304783" y="5464148"/>
+            <a:ext cx="4699149" cy="1200329"/>
+          </a:xfrm>
+          <a:prstGeom prst="rect">
+            <a:avLst/>
+          </a:prstGeom>
+          <a:noFill/>
+        </p:spPr>
+        <p:txBody>
+          <a:bodyPr wrap="square" rtlCol="0">
+            <a:spAutoFit/>
+          </a:bodyPr>
+          <a:lstStyle/>
+          <a:p>
+            <a:pPr marL="457200" indent="-457200">
+              <a:buFont typeface="+mj-lt"/>
+              <a:buAutoNum type="arabicPeriod" startAt="3"/>
+            </a:pPr>
+            <a:r>
+              <a:rPr lang="en-US" sz="2400" dirty="0"/>
+              <a:t>Similarity scores computed between text and image embeddings</a:t>
+            </a:r>
+          </a:p>
+        </p:txBody>
+      </p:sp>
+      <p:cxnSp>
+        <p:nvCxnSpPr>
+          <p:cNvPr id="11" name="Straight Arrow Connector 10">
+            <a:extLst>
+              <a:ext uri="{FF2B5EF4-FFF2-40B4-BE49-F238E27FC236}">
+                <a16:creationId xmlns:a16="http://schemas.microsoft.com/office/drawing/2014/main" id="{469A32BD-66C2-3E5C-7EAD-3290D33E40AF}"/>
+              </a:ext>
+            </a:extLst>
+          </p:cNvPr>
+          <p:cNvCxnSpPr>
+            <a:cxnSpLocks/>
+            <a:stCxn id="10" idx="1"/>
+          </p:cNvCxnSpPr>
+          <p:nvPr/>
+        </p:nvCxnSpPr>
+        <p:spPr>
+          <a:xfrm flipH="1" flipV="1">
+            <a:off x="5869021" y="5747288"/>
+            <a:ext cx="1435762" cy="317025"/>
+          </a:xfrm>
+          <a:prstGeom prst="straightConnector1">
+            <a:avLst/>
+          </a:prstGeom>
+          <a:ln w="31750">
+            <a:solidFill>
+              <a:schemeClr val="tx1"/>
+            </a:solidFill>
+            <a:tailEnd type="triangle"/>
+          </a:ln>
+        </p:spPr>
+        <p:style>
+          <a:lnRef idx="1">
+            <a:schemeClr val="accent1"/>
+          </a:lnRef>
+          <a:fillRef idx="0">
+            <a:schemeClr val="accent1"/>
+          </a:fillRef>
+          <a:effectRef idx="0">
+            <a:schemeClr val="accent1"/>
+          </a:effectRef>
+          <a:fontRef idx="minor">
+            <a:schemeClr val="tx1"/>
+          </a:fontRef>
+        </p:style>
+      </p:cxnSp>
+      <p:sp>
+        <p:nvSpPr>
+          <p:cNvPr id="18" name="TextBox 17">
+            <a:extLst>
+              <a:ext uri="{FF2B5EF4-FFF2-40B4-BE49-F238E27FC236}">
+                <a16:creationId xmlns:a16="http://schemas.microsoft.com/office/drawing/2014/main" id="{BC3930AC-8A44-302E-E15D-05A3B86DFFD5}"/>
+              </a:ext>
+            </a:extLst>
+          </p:cNvPr>
+          <p:cNvSpPr txBox="1"/>
+          <p:nvPr/>
+        </p:nvSpPr>
+        <p:spPr>
+          <a:xfrm>
+            <a:off x="7553567" y="3818734"/>
+            <a:ext cx="3491865" cy="830997"/>
+          </a:xfrm>
+          <a:prstGeom prst="rect">
+            <a:avLst/>
+          </a:prstGeom>
+          <a:noFill/>
+        </p:spPr>
+        <p:txBody>
+          <a:bodyPr wrap="square" rtlCol="0">
+            <a:spAutoFit/>
+          </a:bodyPr>
+          <a:lstStyle/>
+          <a:p>
+            <a:pPr marL="457200" indent="-457200">
+              <a:buFont typeface="+mj-lt"/>
+              <a:buAutoNum type="arabicPeriod" startAt="2"/>
+            </a:pPr>
+            <a:r>
+              <a:rPr lang="en-US" sz="2400" dirty="0"/>
+              <a:t>Embedded images from database</a:t>
+            </a:r>
+          </a:p>
+        </p:txBody>
+      </p:sp>
+      <p:cxnSp>
+        <p:nvCxnSpPr>
+          <p:cNvPr id="19" name="Straight Arrow Connector 18">
+            <a:extLst>
+              <a:ext uri="{FF2B5EF4-FFF2-40B4-BE49-F238E27FC236}">
+                <a16:creationId xmlns:a16="http://schemas.microsoft.com/office/drawing/2014/main" id="{C172ED3F-1A19-96D0-970F-E4646497EF28}"/>
+              </a:ext>
+            </a:extLst>
+          </p:cNvPr>
+          <p:cNvCxnSpPr>
+            <a:cxnSpLocks/>
+          </p:cNvCxnSpPr>
+          <p:nvPr/>
+        </p:nvCxnSpPr>
+        <p:spPr>
+          <a:xfrm flipH="1">
+            <a:off x="6310009" y="4410211"/>
+            <a:ext cx="1310220" cy="680598"/>
+          </a:xfrm>
+          <a:prstGeom prst="straightConnector1">
+            <a:avLst/>
+          </a:prstGeom>
+          <a:ln w="31750">
+            <a:solidFill>
+              <a:schemeClr val="tx1"/>
+            </a:solidFill>
+            <a:tailEnd type="triangle"/>
+          </a:ln>
+        </p:spPr>
+        <p:style>
+          <a:lnRef idx="1">
+            <a:schemeClr val="accent1"/>
+          </a:lnRef>
+          <a:fillRef idx="0">
+            <a:schemeClr val="accent1"/>
+          </a:fillRef>
+          <a:effectRef idx="0">
+            <a:schemeClr val="accent1"/>
+          </a:effectRef>
+          <a:fontRef idx="minor">
+            <a:schemeClr val="tx1"/>
+          </a:fontRef>
+        </p:style>
+      </p:cxnSp>
+      <p:sp>
+        <p:nvSpPr>
+          <p:cNvPr id="24" name="TextBox 23">
+            <a:extLst>
+              <a:ext uri="{FF2B5EF4-FFF2-40B4-BE49-F238E27FC236}">
+                <a16:creationId xmlns:a16="http://schemas.microsoft.com/office/drawing/2014/main" id="{93878FCF-CEC5-4918-988C-3CB7672E10F7}"/>
+              </a:ext>
+            </a:extLst>
+          </p:cNvPr>
+          <p:cNvSpPr txBox="1"/>
+          <p:nvPr/>
+        </p:nvSpPr>
+        <p:spPr>
+          <a:xfrm>
+            <a:off x="1874196" y="6290553"/>
+            <a:ext cx="3547353" cy="369332"/>
+          </a:xfrm>
+          <a:prstGeom prst="rect">
+            <a:avLst/>
+          </a:prstGeom>
+          <a:noFill/>
+        </p:spPr>
+        <p:txBody>
+          <a:bodyPr wrap="square" rtlCol="0">
+            <a:spAutoFit/>
+          </a:bodyPr>
+          <a:lstStyle/>
+          <a:p>
+            <a:r>
+              <a:rPr lang="en-US" dirty="0">
+                <a:hlinkClick r:id="rId3"/>
+              </a:rPr>
+              <a:t>Drawing from Radford, et. al., 2021</a:t>
+            </a:r>
+            <a:endParaRPr lang="en-US" dirty="0"/>
+          </a:p>
+        </p:txBody>
+      </p:sp>
+    </p:spTree>
+    <p:extLst>
+      <p:ext uri="{BB962C8B-B14F-4D97-AF65-F5344CB8AC3E}">
+        <p14:creationId xmlns:p14="http://schemas.microsoft.com/office/powerpoint/2010/main" val="2642663674"/>
+      </p:ext>
+    </p:extLst>
+  </p:cSld>
+  <p:clrMapOvr>
+    <a:masterClrMapping/>
+  </p:clrMapOvr>
+  <p:timing>
+    <p:tnLst>
+      <p:par>
+        <p:cTn id="1" dur="indefinite" restart="never" nodeType="tmRoot">
+          <p:childTnLst>
+            <p:seq concurrent="1" nextAc="seek">
+              <p:cTn id="2" dur="indefinite" nodeType="mainSeq">
+                <p:childTnLst>
+                  <p:par>
+                    <p:cTn id="3" fill="hold">
+                      <p:stCondLst>
+                        <p:cond delay="indefinite"/>
+                      </p:stCondLst>
+                      <p:childTnLst>
+                        <p:par>
+                          <p:cTn id="4" fill="hold">
+                            <p:stCondLst>
+                              <p:cond delay="0"/>
+                            </p:stCondLst>
+                            <p:childTnLst>
+                              <p:par>
+                                <p:cTn id="5" presetID="1" presetClass="entr" presetSubtype="0" fill="hold" nodeType="clickEffect">
+                                  <p:stCondLst>
+                                    <p:cond delay="0"/>
+                                  </p:stCondLst>
+                                  <p:childTnLst>
+                                    <p:set>
+                                      <p:cBhvr>
+                                        <p:cTn id="6" dur="1" fill="hold">
+                                          <p:stCondLst>
+                                            <p:cond delay="0"/>
+                                          </p:stCondLst>
+                                        </p:cTn>
+                                        <p:tgtEl>
+                                          <p:spTgt spid="9"/>
+                                        </p:tgtEl>
+                                        <p:attrNameLst>
+                                          <p:attrName>style.visibility</p:attrName>
+                                        </p:attrNameLst>
+                                      </p:cBhvr>
+                                      <p:to>
+                                        <p:strVal val="visible"/>
+                                      </p:to>
+                                    </p:set>
+                                  </p:childTnLst>
+                                </p:cTn>
+                              </p:par>
+                              <p:par>
+                                <p:cTn id="7" presetID="1" presetClass="entr" presetSubtype="0" fill="hold" grpId="0" nodeType="withEffect">
+                                  <p:stCondLst>
+                                    <p:cond delay="0"/>
+                                  </p:stCondLst>
+                                  <p:childTnLst>
+                                    <p:set>
+                                      <p:cBhvr>
+                                        <p:cTn id="8" dur="1" fill="hold">
+                                          <p:stCondLst>
+                                            <p:cond delay="0"/>
+                                          </p:stCondLst>
+                                        </p:cTn>
+                                        <p:tgtEl>
+                                          <p:spTgt spid="7"/>
+                                        </p:tgtEl>
+                                        <p:attrNameLst>
+                                          <p:attrName>style.visibility</p:attrName>
+                                        </p:attrNameLst>
+                                      </p:cBhvr>
+                                      <p:to>
+                                        <p:strVal val="visible"/>
+                                      </p:to>
+                                    </p:set>
+                                  </p:childTnLst>
+                                </p:cTn>
+                              </p:par>
+                            </p:childTnLst>
+                          </p:cTn>
+                        </p:par>
+                      </p:childTnLst>
+                    </p:cTn>
+                  </p:par>
+                  <p:par>
+                    <p:cTn id="9" fill="hold">
+                      <p:stCondLst>
+                        <p:cond delay="indefinite"/>
+                      </p:stCondLst>
+                      <p:childTnLst>
+                        <p:par>
+                          <p:cTn id="10" fill="hold">
+                            <p:stCondLst>
+                              <p:cond delay="0"/>
+                            </p:stCondLst>
+                            <p:childTnLst>
+                              <p:par>
+                                <p:cTn id="11" presetID="1" presetClass="entr" presetSubtype="0" fill="hold" grpId="0" nodeType="clickEffect">
+                                  <p:stCondLst>
+                                    <p:cond delay="0"/>
+                                  </p:stCondLst>
+                                  <p:childTnLst>
+                                    <p:set>
+                                      <p:cBhvr>
+                                        <p:cTn id="12" dur="1" fill="hold">
+                                          <p:stCondLst>
+                                            <p:cond delay="0"/>
+                                          </p:stCondLst>
+                                        </p:cTn>
+                                        <p:tgtEl>
+                                          <p:spTgt spid="18"/>
+                                        </p:tgtEl>
+                                        <p:attrNameLst>
+                                          <p:attrName>style.visibility</p:attrName>
+                                        </p:attrNameLst>
+                                      </p:cBhvr>
+                                      <p:to>
+                                        <p:strVal val="visible"/>
+                                      </p:to>
+                                    </p:set>
+                                  </p:childTnLst>
+                                </p:cTn>
+                              </p:par>
+                              <p:par>
+                                <p:cTn id="13" presetID="1" presetClass="entr" presetSubtype="0" fill="hold" nodeType="withEffect">
+                                  <p:stCondLst>
+                                    <p:cond delay="0"/>
+                                  </p:stCondLst>
+                                  <p:childTnLst>
+                                    <p:set>
+                                      <p:cBhvr>
+                                        <p:cTn id="14" dur="1" fill="hold">
+                                          <p:stCondLst>
+                                            <p:cond delay="0"/>
+                                          </p:stCondLst>
+                                        </p:cTn>
+                                        <p:tgtEl>
+                                          <p:spTgt spid="19"/>
+                                        </p:tgtEl>
+                                        <p:attrNameLst>
+                                          <p:attrName>style.visibility</p:attrName>
+                                        </p:attrNameLst>
+                                      </p:cBhvr>
+                                      <p:to>
+                                        <p:strVal val="visible"/>
+                                      </p:to>
+                                    </p:set>
+                                  </p:childTnLst>
+                                </p:cTn>
+                              </p:par>
+                            </p:childTnLst>
+                          </p:cTn>
+                        </p:par>
+                      </p:childTnLst>
+                    </p:cTn>
+                  </p:par>
+                  <p:par>
+                    <p:cTn id="15" fill="hold">
+                      <p:stCondLst>
+                        <p:cond delay="indefinite"/>
+                      </p:stCondLst>
+                      <p:childTnLst>
+                        <p:par>
+                          <p:cTn id="16" fill="hold">
+                            <p:stCondLst>
+                              <p:cond delay="0"/>
+                            </p:stCondLst>
+                            <p:childTnLst>
+                              <p:par>
+                                <p:cTn id="17" presetID="1" presetClass="entr" presetSubtype="0" fill="hold" grpId="0" nodeType="clickEffect">
+                                  <p:stCondLst>
+                                    <p:cond delay="0"/>
+                                  </p:stCondLst>
+                                  <p:childTnLst>
+                                    <p:set>
+                                      <p:cBhvr>
+                                        <p:cTn id="18" dur="1" fill="hold">
+                                          <p:stCondLst>
+                                            <p:cond delay="0"/>
+                                          </p:stCondLst>
+                                        </p:cTn>
+                                        <p:tgtEl>
+                                          <p:spTgt spid="10"/>
+                                        </p:tgtEl>
+                                        <p:attrNameLst>
+                                          <p:attrName>style.visibility</p:attrName>
+                                        </p:attrNameLst>
+                                      </p:cBhvr>
+                                      <p:to>
+                                        <p:strVal val="visible"/>
+                                      </p:to>
+                                    </p:set>
+                                  </p:childTnLst>
+                                </p:cTn>
+                              </p:par>
+                              <p:par>
+                                <p:cTn id="19" presetID="1" presetClass="entr" presetSubtype="0" fill="hold" nodeType="withEffect">
+                                  <p:stCondLst>
+                                    <p:cond delay="0"/>
+                                  </p:stCondLst>
+                                  <p:childTnLst>
+                                    <p:set>
+                                      <p:cBhvr>
+                                        <p:cTn id="20" dur="1" fill="hold">
+                                          <p:stCondLst>
+                                            <p:cond delay="0"/>
+                                          </p:stCondLst>
+                                        </p:cTn>
+                                        <p:tgtEl>
+                                          <p:spTgt spid="11"/>
+                                        </p:tgtEl>
+                                        <p:attrNameLst>
+                                          <p:attrName>style.visibility</p:attrName>
+                                        </p:attrNameLst>
+                                      </p:cBhvr>
+                                      <p:to>
+                                        <p:strVal val="visible"/>
+                                      </p:to>
+                                    </p:set>
+                                  </p:childTnLst>
+                                </p:cTn>
+                              </p:par>
+                            </p:childTnLst>
+                          </p:cTn>
+                        </p:par>
+                      </p:childTnLst>
+                    </p:cTn>
+                  </p:par>
+                </p:childTnLst>
+              </p:cTn>
+              <p:prevCondLst>
+                <p:cond evt="onPrev" delay="0">
+                  <p:tgtEl>
+                    <p:sldTgt/>
+                  </p:tgtEl>
+                </p:cond>
+              </p:prevCondLst>
+              <p:nextCondLst>
+                <p:cond evt="onNext" delay="0">
+                  <p:tgtEl>
+                    <p:sldTgt/>
+                  </p:tgtEl>
+                </p:cond>
+              </p:nextCondLst>
+            </p:seq>
+          </p:childTnLst>
+        </p:cTn>
+      </p:par>
+    </p:tnLst>
+    <p:bldLst>
+      <p:bldP spid="7" grpId="0"/>
+      <p:bldP spid="10" grpId="0"/>
+      <p:bldP spid="18" grpId="0"/>
+    </p:bldLst>
+  </p:timing>
+</p:sld>
+</file>
+
+<file path=ppt/slides/slide51.xml><?xml version="1.0" encoding="utf-8"?>
+<p:sld xmlns:a="http://schemas.openxmlformats.org/drawingml/2006/main" xmlns:r="http://schemas.openxmlformats.org/officeDocument/2006/relationships" xmlns:p="http://schemas.openxmlformats.org/presentationml/2006/main">
+  <p:cSld>
+    <p:spTree>
+      <p:nvGrpSpPr>
+        <p:cNvPr id="1" name="">
+          <a:extLst>
+            <a:ext uri="{FF2B5EF4-FFF2-40B4-BE49-F238E27FC236}">
               <a16:creationId xmlns:a16="http://schemas.microsoft.com/office/drawing/2014/main" id="{1F632CC0-C406-9CAC-71A7-E8CD0AF66F8C}"/>
             </a:ext>
           </a:extLst>
@@ -34744,7 +35553,7 @@
 </p:sld>
 </file>
 
-<file path=ppt/slides/slide51.xml><?xml version="1.0" encoding="utf-8"?>
+<file path=ppt/slides/slide52.xml><?xml version="1.0" encoding="utf-8"?>
 <p:sld xmlns:a="http://schemas.openxmlformats.org/drawingml/2006/main" xmlns:r="http://schemas.openxmlformats.org/officeDocument/2006/relationships" xmlns:p="http://schemas.openxmlformats.org/presentationml/2006/main">
   <p:cSld>
     <p:spTree>

</xml_diff>